<commit_message>
Completed TODOs for "04.1. Loops - Basics" slides
</commit_message>
<xml_diff>
--- a/Courses/Software-Sciences/Module-1-OOP-New/04.1-Loops-Basics/04.1-Loops-Basics.pptx
+++ b/Courses/Software-Sciences/Module-1-OOP-New/04.1-Loops-Basics/04.1-Loops-Basics.pptx
@@ -335,7 +335,7 @@
           <a:p>
             <a:fld id="{4E087215-0C8F-4762-A664-737A353EC9A4}" type="datetimeFigureOut">
               <a:rPr lang="bg-BG" smtClean="0"/>
-              <a:t>9.2.2023 г.</a:t>
+              <a:t>12.02.23 г.</a:t>
             </a:fld>
             <a:endParaRPr lang="bg-BG"/>
           </a:p>
@@ -526,7 +526,7 @@
           <a:p>
             <a:fld id="{72D84649-876A-46C9-8472-14CB09C070D8}" type="datetimeFigureOut">
               <a:rPr lang="en-US" smtClean="0"/>
-              <a:t>9-Feb-23</a:t>
+              <a:t>2/12/23</a:t>
             </a:fld>
             <a:endParaRPr lang="en-US"/>
           </a:p>
@@ -9569,19 +9569,19 @@
           <a:lstStyle/>
           <a:p>
             <a:r>
-              <a:rPr lang="en-US"/>
+              <a:rPr lang="en-US" dirty="0"/>
               <a:t>For-</a:t>
             </a:r>
             <a:r>
-              <a:rPr lang="bg-BG"/>
+              <a:rPr lang="bg-BG" dirty="0"/>
               <a:t>цикъл, </a:t>
             </a:r>
             <a:r>
-              <a:rPr lang="en-US"/>
+              <a:rPr lang="en-US" dirty="0"/>
               <a:t>While-</a:t>
             </a:r>
             <a:r>
-              <a:rPr lang="bg-BG"/>
+              <a:rPr lang="bg-BG" dirty="0"/>
               <a:t>цикъл, вложени цикли</a:t>
             </a:r>
             <a:endParaRPr lang="en-US" dirty="0"/>
@@ -10476,7 +10476,7 @@
         </p:nvGrpSpPr>
         <p:grpSpPr>
           <a:xfrm>
-            <a:off x="4605299" y="551432"/>
+            <a:off x="4648347" y="137291"/>
             <a:ext cx="2376821" cy="731330"/>
             <a:chOff x="3690717" y="456205"/>
             <a:chExt cx="2377440" cy="731520"/>
@@ -10640,7 +10640,7 @@
         </p:nvCxnSpPr>
         <p:spPr>
           <a:xfrm rot="5400000">
-            <a:off x="5528429" y="1565103"/>
+            <a:off x="5571477" y="1150962"/>
             <a:ext cx="530563" cy="3423"/>
           </a:xfrm>
           <a:prstGeom prst="straightConnector1">
@@ -10679,7 +10679,7 @@
         </p:nvSpPr>
         <p:spPr>
           <a:xfrm>
-            <a:off x="6949186" y="3290853"/>
+            <a:off x="6992234" y="2876712"/>
             <a:ext cx="771784" cy="556519"/>
           </a:xfrm>
           <a:prstGeom prst="rect">
@@ -10746,7 +10746,7 @@
         </p:nvCxnSpPr>
         <p:spPr>
           <a:xfrm>
-            <a:off x="6968630" y="3916550"/>
+            <a:off x="7011678" y="3502409"/>
             <a:ext cx="732896" cy="19489"/>
           </a:xfrm>
           <a:prstGeom prst="straightConnector1">
@@ -10779,8 +10779,8 @@
         </p:nvGrpSpPr>
         <p:grpSpPr>
           <a:xfrm>
-            <a:off x="4605299" y="5300990"/>
-            <a:ext cx="2376821" cy="1005578"/>
+            <a:off x="4637654" y="4798042"/>
+            <a:ext cx="2376821" cy="567182"/>
             <a:chOff x="3429635" y="5232613"/>
             <a:chExt cx="2377440" cy="1005840"/>
           </a:xfrm>
@@ -10876,7 +10876,7 @@
           <p:spPr>
             <a:xfrm>
               <a:off x="3429635" y="5232613"/>
-              <a:ext cx="2377440" cy="1005840"/>
+              <a:ext cx="2377440" cy="601969"/>
             </a:xfrm>
             <a:prstGeom prst="rect">
               <a:avLst/>
@@ -10914,85 +10914,9 @@
                 <a:t>print i;</a:t>
               </a:r>
             </a:p>
-            <a:p>
-              <a:pPr algn="ctr" eaLnBrk="0" hangingPunct="0">
-                <a:lnSpc>
-                  <a:spcPct val="110000"/>
-                </a:lnSpc>
-                <a:buClr>
-                  <a:schemeClr val="accent5">
-                    <a:lumMod val="40000"/>
-                    <a:lumOff val="60000"/>
-                  </a:schemeClr>
-                </a:buClr>
-                <a:buSzPct val="70000"/>
-              </a:pPr>
-              <a:r>
-                <a:rPr lang="en-US" sz="2399" noProof="1">
-                  <a:solidFill>
-                    <a:schemeClr val="bg2"/>
-                  </a:solidFill>
-                  <a:latin typeface="Consolas" pitchFamily="49" charset="0"/>
-                </a:rPr>
-                <a:t>i</a:t>
-              </a:r>
-              <a:r>
-                <a:rPr lang="en-US" sz="2399" dirty="0">
-                  <a:solidFill>
-                    <a:schemeClr val="bg2"/>
-                  </a:solidFill>
-                  <a:latin typeface="Consolas" pitchFamily="49" charset="0"/>
-                </a:rPr>
-                <a:t>--;</a:t>
-              </a:r>
-            </a:p>
           </p:txBody>
         </p:sp>
       </p:grpSp>
-      <p:cxnSp>
-        <p:nvCxnSpPr>
-          <p:cNvPr id="36" name="Elbow Connector 37">
-            <a:extLst>
-              <a:ext uri="{FF2B5EF4-FFF2-40B4-BE49-F238E27FC236}">
-                <a16:creationId xmlns:a16="http://schemas.microsoft.com/office/drawing/2014/main" id="{25492B2E-6492-41E8-96A3-B4CC8B0CFBF2}"/>
-              </a:ext>
-            </a:extLst>
-          </p:cNvPr>
-          <p:cNvCxnSpPr>
-            <a:cxnSpLocks/>
-          </p:cNvCxnSpPr>
-          <p:nvPr/>
-        </p:nvCxnSpPr>
-        <p:spPr>
-          <a:xfrm rot="10800000" flipH="1">
-            <a:off x="4565844" y="3923403"/>
-            <a:ext cx="47445" cy="1880379"/>
-          </a:xfrm>
-          <a:prstGeom prst="bentConnector4">
-            <a:avLst>
-              <a:gd name="adj1" fmla="val -2756391"/>
-              <a:gd name="adj2" fmla="val 101181"/>
-            </a:avLst>
-          </a:prstGeom>
-          <a:ln w="57150">
-            <a:tailEnd type="triangle"/>
-          </a:ln>
-        </p:spPr>
-        <p:style>
-          <a:lnRef idx="1">
-            <a:schemeClr val="accent1"/>
-          </a:lnRef>
-          <a:fillRef idx="0">
-            <a:schemeClr val="accent1"/>
-          </a:fillRef>
-          <a:effectRef idx="0">
-            <a:schemeClr val="accent1"/>
-          </a:effectRef>
-          <a:fontRef idx="minor">
-            <a:schemeClr val="tx1"/>
-          </a:fontRef>
-        </p:style>
-      </p:cxnSp>
       <p:sp>
         <p:nvSpPr>
           <p:cNvPr id="37" name="TextBox 36">
@@ -11007,7 +10931,7 @@
         </p:nvSpPr>
         <p:spPr>
           <a:xfrm>
-            <a:off x="5841179" y="4600238"/>
+            <a:off x="5886875" y="4110967"/>
             <a:ext cx="729845" cy="539531"/>
           </a:xfrm>
           <a:prstGeom prst="rect">
@@ -11072,7 +10996,7 @@
         </p:nvSpPr>
         <p:spPr bwMode="auto">
           <a:xfrm>
-            <a:off x="7762952" y="3573141"/>
+            <a:off x="7806000" y="3159000"/>
             <a:ext cx="3157585" cy="706304"/>
           </a:xfrm>
           <a:prstGeom prst="flowChartTerminator">
@@ -11143,7 +11067,7 @@
         </p:nvGrpSpPr>
         <p:grpSpPr>
           <a:xfrm>
-            <a:off x="4605299" y="1858917"/>
+            <a:off x="4648347" y="1444776"/>
             <a:ext cx="2376821" cy="731330"/>
             <a:chOff x="3690717" y="1764030"/>
             <a:chExt cx="2377440" cy="731520"/>
@@ -11301,8 +11225,8 @@
         </p:nvGrpSpPr>
         <p:grpSpPr>
           <a:xfrm>
-            <a:off x="4680313" y="3212386"/>
-            <a:ext cx="2226795" cy="1427819"/>
+            <a:off x="4977286" y="2894244"/>
+            <a:ext cx="1726933" cy="1226631"/>
             <a:chOff x="3499050" y="3117850"/>
             <a:chExt cx="2227375" cy="1428191"/>
           </a:xfrm>
@@ -11451,7 +11375,7 @@
         </p:nvCxnSpPr>
         <p:spPr>
           <a:xfrm rot="5400000">
-            <a:off x="5528429" y="2898256"/>
+            <a:off x="5571477" y="2484115"/>
             <a:ext cx="530563" cy="3423"/>
           </a:xfrm>
           <a:prstGeom prst="straightConnector1">
@@ -11492,7 +11416,7 @@
         </p:nvCxnSpPr>
         <p:spPr>
           <a:xfrm rot="5400000">
-            <a:off x="5528429" y="4942424"/>
+            <a:off x="5574125" y="4453153"/>
             <a:ext cx="530563" cy="3423"/>
           </a:xfrm>
           <a:prstGeom prst="straightConnector1">
@@ -11647,6 +11571,409 @@
           </a:p>
         </p:txBody>
       </p:sp>
+      <p:grpSp>
+        <p:nvGrpSpPr>
+          <p:cNvPr id="6" name="Групиране 80">
+            <a:extLst>
+              <a:ext uri="{FF2B5EF4-FFF2-40B4-BE49-F238E27FC236}">
+                <a16:creationId xmlns:a16="http://schemas.microsoft.com/office/drawing/2014/main" id="{E9EE3782-CCEF-3899-618A-03DA767C967C}"/>
+              </a:ext>
+            </a:extLst>
+          </p:cNvPr>
+          <p:cNvGrpSpPr/>
+          <p:nvPr/>
+        </p:nvGrpSpPr>
+        <p:grpSpPr>
+          <a:xfrm>
+            <a:off x="4645282" y="6104445"/>
+            <a:ext cx="2376821" cy="573975"/>
+            <a:chOff x="3429635" y="5232612"/>
+            <a:chExt cx="2377440" cy="601969"/>
+          </a:xfrm>
+        </p:grpSpPr>
+        <p:sp>
+          <p:nvSpPr>
+            <p:cNvPr id="7" name="Rectangle 6">
+              <a:extLst>
+                <a:ext uri="{FF2B5EF4-FFF2-40B4-BE49-F238E27FC236}">
+                  <a16:creationId xmlns:a16="http://schemas.microsoft.com/office/drawing/2014/main" id="{D071045C-47F4-920C-3FF5-FED01A7DE11B}"/>
+                </a:ext>
+              </a:extLst>
+            </p:cNvPr>
+            <p:cNvSpPr/>
+            <p:nvPr/>
+          </p:nvSpPr>
+          <p:spPr bwMode="auto">
+            <a:xfrm>
+              <a:off x="3429635" y="5232613"/>
+              <a:ext cx="2377440" cy="599132"/>
+            </a:xfrm>
+            <a:prstGeom prst="rect">
+              <a:avLst/>
+            </a:prstGeom>
+            <a:solidFill>
+              <a:schemeClr val="dk2">
+                <a:alpha val="80000"/>
+              </a:schemeClr>
+            </a:solidFill>
+            <a:ln w="19050">
+              <a:solidFill>
+                <a:schemeClr val="tx1">
+                  <a:lumMod val="75000"/>
+                  <a:alpha val="80000"/>
+                </a:schemeClr>
+              </a:solidFill>
+            </a:ln>
+            <a:effectLst/>
+          </p:spPr>
+          <p:style>
+            <a:lnRef idx="2">
+              <a:schemeClr val="accent1">
+                <a:shade val="50000"/>
+              </a:schemeClr>
+            </a:lnRef>
+            <a:fillRef idx="1001">
+              <a:schemeClr val="dk2"/>
+            </a:fillRef>
+            <a:effectRef idx="0">
+              <a:schemeClr val="accent1"/>
+            </a:effectRef>
+            <a:fontRef idx="minor">
+              <a:schemeClr val="lt1"/>
+            </a:fontRef>
+          </p:style>
+          <p:txBody>
+            <a:bodyPr rot="0" spcFirstLastPara="0" vertOverflow="overflow" horzOverflow="overflow" vert="horz" wrap="square" lIns="91416" tIns="45708" rIns="91416" bIns="45708" numCol="1" spcCol="0" rtlCol="0" fromWordArt="0" anchor="ctr" anchorCtr="0" forceAA="0" compatLnSpc="1">
+              <a:prstTxWarp prst="textNoShape">
+                <a:avLst/>
+              </a:prstTxWarp>
+              <a:noAutofit/>
+            </a:bodyPr>
+            <a:lstStyle/>
+            <a:p>
+              <a:pPr algn="ctr"/>
+              <a:endParaRPr lang="bg-BG" sz="2799" b="1" dirty="0">
+                <a:solidFill>
+                  <a:srgbClr val="FFFFFF"/>
+                </a:solidFill>
+                <a:effectLst>
+                  <a:outerShdw blurRad="38100" dist="38100" dir="2700000" algn="tl">
+                    <a:srgbClr val="000000">
+                      <a:alpha val="43137"/>
+                    </a:srgbClr>
+                  </a:outerShdw>
+                </a:effectLst>
+              </a:endParaRPr>
+            </a:p>
+          </p:txBody>
+        </p:sp>
+        <p:sp>
+          <p:nvSpPr>
+            <p:cNvPr id="8" name="TextBox 7">
+              <a:extLst>
+                <a:ext uri="{FF2B5EF4-FFF2-40B4-BE49-F238E27FC236}">
+                  <a16:creationId xmlns:a16="http://schemas.microsoft.com/office/drawing/2014/main" id="{059CCA73-0ED4-1366-9934-EAFC05805D56}"/>
+                </a:ext>
+              </a:extLst>
+            </p:cNvPr>
+            <p:cNvSpPr txBox="1"/>
+            <p:nvPr/>
+          </p:nvSpPr>
+          <p:spPr>
+            <a:xfrm>
+              <a:off x="3429635" y="5232612"/>
+              <a:ext cx="2377440" cy="601969"/>
+            </a:xfrm>
+            <a:prstGeom prst="rect">
+              <a:avLst/>
+            </a:prstGeom>
+            <a:noFill/>
+            <a:ln w="12700">
+              <a:noFill/>
+            </a:ln>
+          </p:spPr>
+          <p:txBody>
+            <a:bodyPr vert="horz" wrap="square" lIns="143963" tIns="107972" rIns="143963" bIns="107972" rtlCol="0">
+              <a:spAutoFit/>
+            </a:bodyPr>
+            <a:lstStyle/>
+            <a:p>
+              <a:pPr algn="ctr" eaLnBrk="0" hangingPunct="0">
+                <a:lnSpc>
+                  <a:spcPct val="110000"/>
+                </a:lnSpc>
+                <a:buClr>
+                  <a:schemeClr val="accent5">
+                    <a:lumMod val="40000"/>
+                    <a:lumOff val="60000"/>
+                  </a:schemeClr>
+                </a:buClr>
+                <a:buSzPct val="70000"/>
+              </a:pPr>
+              <a:r>
+                <a:rPr lang="en-US" sz="2399" noProof="1">
+                  <a:solidFill>
+                    <a:schemeClr val="bg2"/>
+                  </a:solidFill>
+                  <a:latin typeface="Consolas" pitchFamily="49" charset="0"/>
+                </a:rPr>
+                <a:t>i</a:t>
+              </a:r>
+              <a:r>
+                <a:rPr lang="en-US" sz="2399" dirty="0">
+                  <a:solidFill>
+                    <a:schemeClr val="bg2"/>
+                  </a:solidFill>
+                  <a:latin typeface="Consolas" pitchFamily="49" charset="0"/>
+                </a:rPr>
+                <a:t>--;</a:t>
+              </a:r>
+            </a:p>
+          </p:txBody>
+        </p:sp>
+      </p:grpSp>
+      <p:cxnSp>
+        <p:nvCxnSpPr>
+          <p:cNvPr id="9" name="Straight Arrow Connector 27">
+            <a:extLst>
+              <a:ext uri="{FF2B5EF4-FFF2-40B4-BE49-F238E27FC236}">
+                <a16:creationId xmlns:a16="http://schemas.microsoft.com/office/drawing/2014/main" id="{4B99C9C8-0E3A-968C-E062-09E07C804C4F}"/>
+              </a:ext>
+            </a:extLst>
+          </p:cNvPr>
+          <p:cNvCxnSpPr>
+            <a:cxnSpLocks/>
+          </p:cNvCxnSpPr>
+          <p:nvPr/>
+        </p:nvCxnSpPr>
+        <p:spPr>
+          <a:xfrm rot="5400000">
+            <a:off x="5568054" y="5741933"/>
+            <a:ext cx="530563" cy="3423"/>
+          </a:xfrm>
+          <a:prstGeom prst="straightConnector1">
+            <a:avLst/>
+          </a:prstGeom>
+          <a:ln w="57150">
+            <a:tailEnd type="triangle"/>
+          </a:ln>
+        </p:spPr>
+        <p:style>
+          <a:lnRef idx="1">
+            <a:schemeClr val="accent1"/>
+          </a:lnRef>
+          <a:fillRef idx="0">
+            <a:schemeClr val="accent1"/>
+          </a:fillRef>
+          <a:effectRef idx="0">
+            <a:schemeClr val="accent1"/>
+          </a:effectRef>
+          <a:fontRef idx="minor">
+            <a:schemeClr val="tx1"/>
+          </a:fontRef>
+        </p:style>
+      </p:cxnSp>
+      <p:grpSp>
+        <p:nvGrpSpPr>
+          <p:cNvPr id="12" name="Group 11">
+            <a:extLst>
+              <a:ext uri="{FF2B5EF4-FFF2-40B4-BE49-F238E27FC236}">
+                <a16:creationId xmlns:a16="http://schemas.microsoft.com/office/drawing/2014/main" id="{1C5401E1-26CA-9A14-5045-C2CC8913F243}"/>
+              </a:ext>
+            </a:extLst>
+          </p:cNvPr>
+          <p:cNvGrpSpPr/>
+          <p:nvPr/>
+        </p:nvGrpSpPr>
+        <p:grpSpPr>
+          <a:xfrm>
+            <a:off x="4005258" y="3502410"/>
+            <a:ext cx="719576" cy="2904588"/>
+            <a:chOff x="7696464" y="1757842"/>
+            <a:chExt cx="601683" cy="3833196"/>
+          </a:xfrm>
+          <a:solidFill>
+            <a:schemeClr val="accent1"/>
+          </a:solidFill>
+        </p:grpSpPr>
+        <p:sp>
+          <p:nvSpPr>
+            <p:cNvPr id="13" name="Rectangle 12">
+              <a:extLst>
+                <a:ext uri="{FF2B5EF4-FFF2-40B4-BE49-F238E27FC236}">
+                  <a16:creationId xmlns:a16="http://schemas.microsoft.com/office/drawing/2014/main" id="{FFB1D8C9-F778-27B4-2E98-93DCA4DE4ABB}"/>
+                </a:ext>
+              </a:extLst>
+            </p:cNvPr>
+            <p:cNvSpPr/>
+            <p:nvPr/>
+          </p:nvSpPr>
+          <p:spPr bwMode="auto">
+            <a:xfrm>
+              <a:off x="7696464" y="1757842"/>
+              <a:ext cx="45719" cy="3751674"/>
+            </a:xfrm>
+            <a:prstGeom prst="rect">
+              <a:avLst/>
+            </a:prstGeom>
+            <a:grpFill/>
+            <a:ln w="19050">
+              <a:noFill/>
+            </a:ln>
+            <a:effectLst/>
+          </p:spPr>
+          <p:style>
+            <a:lnRef idx="2">
+              <a:schemeClr val="accent1">
+                <a:shade val="50000"/>
+              </a:schemeClr>
+            </a:lnRef>
+            <a:fillRef idx="1001">
+              <a:schemeClr val="dk2"/>
+            </a:fillRef>
+            <a:effectRef idx="0">
+              <a:schemeClr val="accent1"/>
+            </a:effectRef>
+            <a:fontRef idx="minor">
+              <a:schemeClr val="lt1"/>
+            </a:fontRef>
+          </p:style>
+          <p:txBody>
+            <a:bodyPr rot="0" spcFirstLastPara="0" vertOverflow="overflow" horzOverflow="overflow" vert="horz" wrap="square" lIns="91440" tIns="45720" rIns="91440" bIns="45720" numCol="1" spcCol="0" rtlCol="0" fromWordArt="0" anchor="ctr" anchorCtr="0" forceAA="0" compatLnSpc="1">
+              <a:prstTxWarp prst="textNoShape">
+                <a:avLst/>
+              </a:prstTxWarp>
+              <a:noAutofit/>
+            </a:bodyPr>
+            <a:lstStyle/>
+            <a:p>
+              <a:pPr algn="ctr"/>
+              <a:endParaRPr lang="en-BG" sz="2800" b="1" dirty="0">
+                <a:solidFill>
+                  <a:srgbClr val="FFFFFF"/>
+                </a:solidFill>
+                <a:effectLst>
+                  <a:outerShdw blurRad="38100" dist="38100" dir="2700000" algn="tl">
+                    <a:srgbClr val="000000">
+                      <a:alpha val="43137"/>
+                    </a:srgbClr>
+                  </a:outerShdw>
+                </a:effectLst>
+              </a:endParaRPr>
+            </a:p>
+          </p:txBody>
+        </p:sp>
+        <p:cxnSp>
+          <p:nvCxnSpPr>
+            <p:cNvPr id="14" name="Straight Arrow Connector 13">
+              <a:extLst>
+                <a:ext uri="{FF2B5EF4-FFF2-40B4-BE49-F238E27FC236}">
+                  <a16:creationId xmlns:a16="http://schemas.microsoft.com/office/drawing/2014/main" id="{88426F6E-3F6B-5CAB-BFD4-BFD5485A37B0}"/>
+                </a:ext>
+              </a:extLst>
+            </p:cNvPr>
+            <p:cNvCxnSpPr>
+              <a:cxnSpLocks/>
+              <a:stCxn id="13" idx="0"/>
+            </p:cNvCxnSpPr>
+            <p:nvPr/>
+          </p:nvCxnSpPr>
+          <p:spPr>
+            <a:xfrm>
+              <a:off x="7719324" y="1757842"/>
+              <a:ext cx="578823" cy="0"/>
+            </a:xfrm>
+            <a:prstGeom prst="straightConnector1">
+              <a:avLst/>
+            </a:prstGeom>
+            <a:grpFill/>
+            <a:ln w="50800">
+              <a:tailEnd type="triangle"/>
+            </a:ln>
+          </p:spPr>
+          <p:style>
+            <a:lnRef idx="1">
+              <a:schemeClr val="accent1"/>
+            </a:lnRef>
+            <a:fillRef idx="0">
+              <a:schemeClr val="accent1"/>
+            </a:fillRef>
+            <a:effectRef idx="0">
+              <a:schemeClr val="accent1"/>
+            </a:effectRef>
+            <a:fontRef idx="minor">
+              <a:schemeClr val="tx1"/>
+            </a:fontRef>
+          </p:style>
+        </p:cxnSp>
+        <p:sp>
+          <p:nvSpPr>
+            <p:cNvPr id="15" name="Rectangle 14">
+              <a:extLst>
+                <a:ext uri="{FF2B5EF4-FFF2-40B4-BE49-F238E27FC236}">
+                  <a16:creationId xmlns:a16="http://schemas.microsoft.com/office/drawing/2014/main" id="{A701D765-BDB9-A80C-998C-6E639CD938F6}"/>
+                </a:ext>
+              </a:extLst>
+            </p:cNvPr>
+            <p:cNvSpPr/>
+            <p:nvPr/>
+          </p:nvSpPr>
+          <p:spPr bwMode="auto">
+            <a:xfrm>
+              <a:off x="7696464" y="5522015"/>
+              <a:ext cx="418860" cy="69023"/>
+            </a:xfrm>
+            <a:prstGeom prst="rect">
+              <a:avLst/>
+            </a:prstGeom>
+            <a:grpFill/>
+            <a:ln w="19050">
+              <a:noFill/>
+            </a:ln>
+            <a:effectLst/>
+          </p:spPr>
+          <p:style>
+            <a:lnRef idx="2">
+              <a:schemeClr val="accent1">
+                <a:shade val="50000"/>
+              </a:schemeClr>
+            </a:lnRef>
+            <a:fillRef idx="1001">
+              <a:schemeClr val="dk2"/>
+            </a:fillRef>
+            <a:effectRef idx="0">
+              <a:schemeClr val="accent1"/>
+            </a:effectRef>
+            <a:fontRef idx="minor">
+              <a:schemeClr val="lt1"/>
+            </a:fontRef>
+          </p:style>
+          <p:txBody>
+            <a:bodyPr rot="0" spcFirstLastPara="0" vertOverflow="overflow" horzOverflow="overflow" vert="horz" wrap="square" lIns="91440" tIns="45720" rIns="91440" bIns="45720" numCol="1" spcCol="0" rtlCol="0" fromWordArt="0" anchor="ctr" anchorCtr="0" forceAA="0" compatLnSpc="1">
+              <a:prstTxWarp prst="textNoShape">
+                <a:avLst/>
+              </a:prstTxWarp>
+              <a:noAutofit/>
+            </a:bodyPr>
+            <a:lstStyle/>
+            <a:p>
+              <a:pPr algn="ctr"/>
+              <a:endParaRPr lang="en-BG" sz="2800" b="1" dirty="0">
+                <a:solidFill>
+                  <a:srgbClr val="FFFFFF"/>
+                </a:solidFill>
+                <a:effectLst>
+                  <a:outerShdw blurRad="38100" dist="38100" dir="2700000" algn="tl">
+                    <a:srgbClr val="000000">
+                      <a:alpha val="43137"/>
+                    </a:srgbClr>
+                  </a:outerShdw>
+                </a:effectLst>
+              </a:endParaRPr>
+            </a:p>
+          </p:txBody>
+        </p:sp>
+      </p:grpSp>
     </p:spTree>
     <p:extLst>
       <p:ext uri="{BB962C8B-B14F-4D97-AF65-F5344CB8AC3E}">
@@ -11958,21 +12285,93 @@
                                   </p:childTnLst>
                                 </p:cTn>
                               </p:par>
+                            </p:childTnLst>
+                          </p:cTn>
+                        </p:par>
+                      </p:childTnLst>
+                    </p:cTn>
+                  </p:par>
+                  <p:par>
+                    <p:cTn id="27" fill="hold">
+                      <p:stCondLst>
+                        <p:cond delay="indefinite"/>
+                      </p:stCondLst>
+                      <p:childTnLst>
+                        <p:par>
+                          <p:cTn id="28" fill="hold">
+                            <p:stCondLst>
+                              <p:cond delay="0"/>
+                            </p:stCondLst>
+                            <p:childTnLst>
                               <p:par>
-                                <p:cTn id="27" presetID="1" presetClass="entr" presetSubtype="0" fill="hold" nodeType="withEffect">
+                                <p:cTn id="29" presetID="1" presetClass="entr" presetSubtype="0" fill="hold" grpId="0" nodeType="clickEffect">
                                   <p:stCondLst>
                                     <p:cond delay="0"/>
                                   </p:stCondLst>
                                   <p:childTnLst>
                                     <p:set>
                                       <p:cBhvr>
-                                        <p:cTn id="28" dur="1" fill="hold">
+                                        <p:cTn id="30" dur="1" fill="hold">
                                           <p:stCondLst>
                                             <p:cond delay="0"/>
                                           </p:stCondLst>
                                         </p:cTn>
                                         <p:tgtEl>
-                                          <p:spTgt spid="36"/>
+                                          <p:spTgt spid="30"/>
+                                        </p:tgtEl>
+                                        <p:attrNameLst>
+                                          <p:attrName>style.visibility</p:attrName>
+                                        </p:attrNameLst>
+                                      </p:cBhvr>
+                                      <p:to>
+                                        <p:strVal val="visible"/>
+                                      </p:to>
+                                    </p:set>
+                                  </p:childTnLst>
+                                </p:cTn>
+                              </p:par>
+                              <p:par>
+                                <p:cTn id="31" presetID="1" presetClass="entr" presetSubtype="0" fill="hold" nodeType="withEffect">
+                                  <p:stCondLst>
+                                    <p:cond delay="0"/>
+                                  </p:stCondLst>
+                                  <p:childTnLst>
+                                    <p:set>
+                                      <p:cBhvr>
+                                        <p:cTn id="32" dur="1" fill="hold">
+                                          <p:stCondLst>
+                                            <p:cond delay="0"/>
+                                          </p:stCondLst>
+                                        </p:cTn>
+                                        <p:tgtEl>
+                                          <p:spTgt spid="31"/>
+                                        </p:tgtEl>
+                                        <p:attrNameLst>
+                                          <p:attrName>style.visibility</p:attrName>
+                                        </p:attrNameLst>
+                                      </p:cBhvr>
+                                      <p:to>
+                                        <p:strVal val="visible"/>
+                                      </p:to>
+                                    </p:set>
+                                  </p:childTnLst>
+                                </p:cTn>
+                              </p:par>
+                              <p:par>
+                                <p:cTn id="33" presetID="1" presetClass="entr" presetSubtype="0" fill="hold" grpId="0" nodeType="withEffect">
+                                  <p:stCondLst>
+                                    <p:cond delay="0"/>
+                                  </p:stCondLst>
+                                  <p:childTnLst>
+                                    <p:set>
+                                      <p:cBhvr>
+                                        <p:cTn id="34" dur="1" fill="hold">
+                                          <p:stCondLst>
+                                            <p:cond delay="0"/>
+                                          </p:stCondLst>
+                                        </p:cTn>
+                                        <p:tgtEl>
+                                          <p:spTgt spid="38"/>
                                         </p:tgtEl>
                                         <p:attrNameLst>
                                           <p:attrName>style.visibility</p:attrName>
@@ -11992,32 +12391,32 @@
                     </p:cTn>
                   </p:par>
                   <p:par>
-                    <p:cTn id="29" fill="hold">
+                    <p:cTn id="35" fill="hold">
                       <p:stCondLst>
                         <p:cond delay="indefinite"/>
                       </p:stCondLst>
                       <p:childTnLst>
                         <p:par>
-                          <p:cTn id="30" fill="hold">
+                          <p:cTn id="36" fill="hold">
                             <p:stCondLst>
                               <p:cond delay="0"/>
                             </p:stCondLst>
                             <p:childTnLst>
                               <p:par>
-                                <p:cTn id="31" presetID="1" presetClass="entr" presetSubtype="0" fill="hold" grpId="0" nodeType="clickEffect">
+                                <p:cTn id="37" presetID="1" presetClass="entr" presetSubtype="0" fill="hold" nodeType="clickEffect">
                                   <p:stCondLst>
                                     <p:cond delay="0"/>
                                   </p:stCondLst>
                                   <p:childTnLst>
                                     <p:set>
                                       <p:cBhvr>
-                                        <p:cTn id="32" dur="1" fill="hold">
+                                        <p:cTn id="38" dur="1" fill="hold">
                                           <p:stCondLst>
                                             <p:cond delay="0"/>
                                           </p:stCondLst>
                                         </p:cTn>
                                         <p:tgtEl>
-                                          <p:spTgt spid="30"/>
+                                          <p:spTgt spid="6"/>
                                         </p:tgtEl>
                                         <p:attrNameLst>
                                           <p:attrName>style.visibility</p:attrName>
@@ -12031,47 +12430,20 @@
                                 </p:cTn>
                               </p:par>
                               <p:par>
-                                <p:cTn id="33" presetID="1" presetClass="entr" presetSubtype="0" fill="hold" nodeType="withEffect">
+                                <p:cTn id="39" presetID="1" presetClass="entr" presetSubtype="0" fill="hold" nodeType="withEffect">
                                   <p:stCondLst>
                                     <p:cond delay="0"/>
                                   </p:stCondLst>
                                   <p:childTnLst>
                                     <p:set>
                                       <p:cBhvr>
-                                        <p:cTn id="34" dur="1" fill="hold">
+                                        <p:cTn id="40" dur="1" fill="hold">
                                           <p:stCondLst>
                                             <p:cond delay="0"/>
                                           </p:stCondLst>
                                         </p:cTn>
                                         <p:tgtEl>
-                                          <p:spTgt spid="31"/>
-                                        </p:tgtEl>
-                                        <p:attrNameLst>
-                                          <p:attrName>style.visibility</p:attrName>
-                                        </p:attrNameLst>
-                                      </p:cBhvr>
-                                      <p:to>
-                                        <p:strVal val="visible"/>
-                                      </p:to>
-                                    </p:set>
-                                  </p:childTnLst>
-                                </p:cTn>
-                              </p:par>
-                              <p:par>
-                                <p:cTn id="35" presetID="1" presetClass="entr" presetSubtype="0" fill="hold" grpId="0" nodeType="withEffect">
-                                  <p:stCondLst>
-                                    <p:cond delay="0"/>
-                                  </p:stCondLst>
-                                  <p:childTnLst>
-                                    <p:set>
-                                      <p:cBhvr>
-                                        <p:cTn id="36" dur="1" fill="hold">
-                                          <p:stCondLst>
-                                            <p:cond delay="0"/>
-                                          </p:stCondLst>
-                                        </p:cTn>
-                                        <p:tgtEl>
-                                          <p:spTgt spid="38"/>
+                                          <p:spTgt spid="9"/>
                                         </p:tgtEl>
                                         <p:attrNameLst>
                                           <p:attrName>style.visibility</p:attrName>
@@ -19980,7 +20352,7 @@
         </p:nvSpPr>
         <p:spPr>
           <a:xfrm>
-            <a:off x="8921185" y="5331231"/>
+            <a:off x="8920321" y="5403240"/>
             <a:ext cx="1086105" cy="369236"/>
           </a:xfrm>
           <a:prstGeom prst="rect">
@@ -20838,8 +21210,8 @@
         </p:nvSpPr>
         <p:spPr bwMode="auto">
           <a:xfrm>
-            <a:off x="606000" y="1932436"/>
-            <a:ext cx="6252586" cy="2909323"/>
+            <a:off x="876000" y="1944000"/>
+            <a:ext cx="6332560" cy="3383170"/>
           </a:xfrm>
           <a:prstGeom prst="rect">
             <a:avLst/>
@@ -20970,7 +21342,7 @@
                 <a:latin typeface="Consolas" pitchFamily="49" charset="0"/>
                 <a:cs typeface="Consolas" pitchFamily="49" charset="0"/>
               </a:rPr>
-              <a:t>Console.WriteLine(count);</a:t>
+              <a:t>Console.WriteLine("count = " + count);</a:t>
             </a:r>
           </a:p>
           <a:p>
@@ -21036,7 +21408,7 @@
         </p:nvSpPr>
         <p:spPr bwMode="auto">
           <a:xfrm>
-            <a:off x="5060212" y="1534082"/>
+            <a:off x="5420212" y="1545646"/>
             <a:ext cx="3867651" cy="1093327"/>
           </a:xfrm>
           <a:prstGeom prst="wedgeRoundRectCallout">
@@ -21110,7 +21482,7 @@
         </p:nvSpPr>
         <p:spPr bwMode="auto">
           <a:xfrm>
-            <a:off x="6994038" y="3909413"/>
+            <a:off x="7788149" y="3732540"/>
             <a:ext cx="428262" cy="376871"/>
           </a:xfrm>
           <a:prstGeom prst="rightArrow">
@@ -21184,86 +21556,43 @@
           </a:p>
         </p:txBody>
       </p:sp>
-      <p:sp>
-        <p:nvSpPr>
-          <p:cNvPr id="2" name="Rectangle: Rounded Corners 1">
+      <p:pic>
+        <p:nvPicPr>
+          <p:cNvPr id="3" name="Picture 2">
             <a:extLst>
               <a:ext uri="{FF2B5EF4-FFF2-40B4-BE49-F238E27FC236}">
-                <a16:creationId xmlns:a16="http://schemas.microsoft.com/office/drawing/2014/main" id="{B6C1F109-30CA-EED1-A291-A5F38017690E}"/>
+                <a16:creationId xmlns:a16="http://schemas.microsoft.com/office/drawing/2014/main" id="{C62FBF35-A7DB-E6C0-031F-D289898DE579}"/>
               </a:ext>
             </a:extLst>
           </p:cNvPr>
-          <p:cNvSpPr/>
+          <p:cNvPicPr>
+            <a:picLocks noChangeAspect="1"/>
+          </p:cNvPicPr>
           <p:nvPr/>
-        </p:nvSpPr>
-        <p:spPr bwMode="auto">
+        </p:nvPicPr>
+        <p:blipFill>
+          <a:blip r:embed="rId2"/>
+          <a:stretch>
+            <a:fillRect/>
+          </a:stretch>
+        </p:blipFill>
+        <p:spPr>
           <a:xfrm>
-            <a:off x="7567778" y="2824687"/>
-            <a:ext cx="4250888" cy="2546321"/>
+            <a:off x="8796000" y="2863576"/>
+            <a:ext cx="2488000" cy="2114800"/>
           </a:xfrm>
-          <a:prstGeom prst="roundRect">
+          <a:prstGeom prst="rect">
             <a:avLst/>
           </a:prstGeom>
-          <a:solidFill>
-            <a:srgbClr val="FFFF00">
-              <a:alpha val="80000"/>
-            </a:srgbClr>
-          </a:solidFill>
-          <a:ln w="19050">
+          <a:ln>
             <a:solidFill>
-              <a:schemeClr val="tx1">
-                <a:lumMod val="75000"/>
-                <a:alpha val="80000"/>
+              <a:schemeClr val="bg2">
+                <a:lumMod val="50000"/>
               </a:schemeClr>
             </a:solidFill>
           </a:ln>
-          <a:effectLst/>
         </p:spPr>
-        <p:style>
-          <a:lnRef idx="2">
-            <a:schemeClr val="accent1">
-              <a:shade val="50000"/>
-            </a:schemeClr>
-          </a:lnRef>
-          <a:fillRef idx="1001">
-            <a:schemeClr val="dk2"/>
-          </a:fillRef>
-          <a:effectRef idx="0">
-            <a:schemeClr val="accent1"/>
-          </a:effectRef>
-          <a:fontRef idx="minor">
-            <a:schemeClr val="lt1"/>
-          </a:fontRef>
-        </p:style>
-        <p:txBody>
-          <a:bodyPr rot="0" spcFirstLastPara="0" vertOverflow="overflow" horzOverflow="overflow" vert="horz" wrap="square" lIns="91440" tIns="45720" rIns="91440" bIns="45720" numCol="1" spcCol="0" rtlCol="0" fromWordArt="0" anchor="ctr" anchorCtr="0" forceAA="0" compatLnSpc="1">
-            <a:prstTxWarp prst="textNoShape">
-              <a:avLst/>
-            </a:prstTxWarp>
-            <a:noAutofit/>
-          </a:bodyPr>
-          <a:lstStyle/>
-          <a:p>
-            <a:pPr algn="ctr"/>
-            <a:r>
-              <a:rPr lang="en-US" sz="5400" dirty="0">
-                <a:ln w="0"/>
-                <a:solidFill>
-                  <a:schemeClr val="tx1"/>
-                </a:solidFill>
-                <a:effectLst>
-                  <a:outerShdw blurRad="38100" dist="19050" dir="2700000" algn="tl" rotWithShape="0">
-                    <a:schemeClr val="dk1">
-                      <a:alpha val="40000"/>
-                    </a:schemeClr>
-                  </a:outerShdw>
-                </a:effectLst>
-              </a:rPr>
-              <a:t>TODO: screenshot</a:t>
-            </a:r>
-          </a:p>
-        </p:txBody>
-      </p:sp>
+      </p:pic>
     </p:spTree>
     <p:extLst>
       <p:ext uri="{BB962C8B-B14F-4D97-AF65-F5344CB8AC3E}">
@@ -39174,12 +39503,921 @@
           </a:p>
         </p:txBody>
       </p:sp>
+      <p:sp>
+        <p:nvSpPr>
+          <p:cNvPr id="26" name="Slide Number">
+            <a:extLst>
+              <a:ext uri="{FF2B5EF4-FFF2-40B4-BE49-F238E27FC236}">
+                <a16:creationId xmlns:a16="http://schemas.microsoft.com/office/drawing/2014/main" id="{49D132EE-557C-4353-935F-67420A5D8DEE}"/>
+              </a:ext>
+            </a:extLst>
+          </p:cNvPr>
+          <p:cNvSpPr txBox="1">
+            <a:spLocks/>
+          </p:cNvSpPr>
+          <p:nvPr/>
+        </p:nvSpPr>
+        <p:spPr>
+          <a:xfrm>
+            <a:off x="11753030" y="6507000"/>
+            <a:ext cx="367414" cy="297000"/>
+          </a:xfrm>
+          <a:prstGeom prst="rect">
+            <a:avLst/>
+          </a:prstGeom>
+        </p:spPr>
+        <p:txBody>
+          <a:bodyPr vert="horz" lIns="91440" tIns="45720" rIns="91440" bIns="45720" rtlCol="0" anchor="b"/>
+          <a:lstStyle>
+            <a:defPPr>
+              <a:defRPr lang="en-US"/>
+            </a:defPPr>
+            <a:lvl1pPr marL="0" algn="r" defTabSz="914400" rtl="0" eaLnBrk="1" latinLnBrk="0" hangingPunct="1">
+              <a:defRPr sz="1000" kern="1200">
+                <a:solidFill>
+                  <a:schemeClr val="tx1"/>
+                </a:solidFill>
+                <a:latin typeface="+mn-lt"/>
+                <a:ea typeface="+mn-ea"/>
+                <a:cs typeface="+mn-cs"/>
+              </a:defRPr>
+            </a:lvl1pPr>
+            <a:lvl2pPr marL="457200" algn="l" defTabSz="914400" rtl="0" eaLnBrk="1" latinLnBrk="0" hangingPunct="1">
+              <a:defRPr sz="1800" kern="1200">
+                <a:solidFill>
+                  <a:schemeClr val="tx1"/>
+                </a:solidFill>
+                <a:latin typeface="+mn-lt"/>
+                <a:ea typeface="+mn-ea"/>
+                <a:cs typeface="+mn-cs"/>
+              </a:defRPr>
+            </a:lvl2pPr>
+            <a:lvl3pPr marL="914400" algn="l" defTabSz="914400" rtl="0" eaLnBrk="1" latinLnBrk="0" hangingPunct="1">
+              <a:defRPr sz="1800" kern="1200">
+                <a:solidFill>
+                  <a:schemeClr val="tx1"/>
+                </a:solidFill>
+                <a:latin typeface="+mn-lt"/>
+                <a:ea typeface="+mn-ea"/>
+                <a:cs typeface="+mn-cs"/>
+              </a:defRPr>
+            </a:lvl3pPr>
+            <a:lvl4pPr marL="1371600" algn="l" defTabSz="914400" rtl="0" eaLnBrk="1" latinLnBrk="0" hangingPunct="1">
+              <a:defRPr sz="1800" kern="1200">
+                <a:solidFill>
+                  <a:schemeClr val="tx1"/>
+                </a:solidFill>
+                <a:latin typeface="+mn-lt"/>
+                <a:ea typeface="+mn-ea"/>
+                <a:cs typeface="+mn-cs"/>
+              </a:defRPr>
+            </a:lvl4pPr>
+            <a:lvl5pPr marL="1828800" algn="l" defTabSz="914400" rtl="0" eaLnBrk="1" latinLnBrk="0" hangingPunct="1">
+              <a:defRPr sz="1800" kern="1200">
+                <a:solidFill>
+                  <a:schemeClr val="tx1"/>
+                </a:solidFill>
+                <a:latin typeface="+mn-lt"/>
+                <a:ea typeface="+mn-ea"/>
+                <a:cs typeface="+mn-cs"/>
+              </a:defRPr>
+            </a:lvl5pPr>
+            <a:lvl6pPr marL="2286000" algn="l" defTabSz="914400" rtl="0" eaLnBrk="1" latinLnBrk="0" hangingPunct="1">
+              <a:defRPr sz="1800" kern="1200">
+                <a:solidFill>
+                  <a:schemeClr val="tx1"/>
+                </a:solidFill>
+                <a:latin typeface="+mn-lt"/>
+                <a:ea typeface="+mn-ea"/>
+                <a:cs typeface="+mn-cs"/>
+              </a:defRPr>
+            </a:lvl6pPr>
+            <a:lvl7pPr marL="2743200" algn="l" defTabSz="914400" rtl="0" eaLnBrk="1" latinLnBrk="0" hangingPunct="1">
+              <a:defRPr sz="1800" kern="1200">
+                <a:solidFill>
+                  <a:schemeClr val="tx1"/>
+                </a:solidFill>
+                <a:latin typeface="+mn-lt"/>
+                <a:ea typeface="+mn-ea"/>
+                <a:cs typeface="+mn-cs"/>
+              </a:defRPr>
+            </a:lvl7pPr>
+            <a:lvl8pPr marL="3200400" algn="l" defTabSz="914400" rtl="0" eaLnBrk="1" latinLnBrk="0" hangingPunct="1">
+              <a:defRPr sz="1800" kern="1200">
+                <a:solidFill>
+                  <a:schemeClr val="tx1"/>
+                </a:solidFill>
+                <a:latin typeface="+mn-lt"/>
+                <a:ea typeface="+mn-ea"/>
+                <a:cs typeface="+mn-cs"/>
+              </a:defRPr>
+            </a:lvl8pPr>
+            <a:lvl9pPr marL="3657600" algn="l" defTabSz="914400" rtl="0" eaLnBrk="1" latinLnBrk="0" hangingPunct="1">
+              <a:defRPr sz="1800" kern="1200">
+                <a:solidFill>
+                  <a:schemeClr val="tx1"/>
+                </a:solidFill>
+                <a:latin typeface="+mn-lt"/>
+                <a:ea typeface="+mn-ea"/>
+                <a:cs typeface="+mn-cs"/>
+              </a:defRPr>
+            </a:lvl9pPr>
+          </a:lstStyle>
+          <a:p>
+            <a:fld id="{2BF067CD-8E6B-4360-9AA8-C5DF2A48A6D1}" type="slidenum">
+              <a:rPr lang="en-US" smtClean="0"/>
+              <a:pPr/>
+              <a:t>5</a:t>
+            </a:fld>
+            <a:endParaRPr lang="en-US" dirty="0"/>
+          </a:p>
+        </p:txBody>
+      </p:sp>
+      <p:sp>
+        <p:nvSpPr>
+          <p:cNvPr id="25" name="Text Placeholder 1">
+            <a:extLst>
+              <a:ext uri="{FF2B5EF4-FFF2-40B4-BE49-F238E27FC236}">
+                <a16:creationId xmlns:a16="http://schemas.microsoft.com/office/drawing/2014/main" id="{9110992C-5185-43F2-89F9-090B4CD629EA}"/>
+              </a:ext>
+            </a:extLst>
+          </p:cNvPr>
+          <p:cNvSpPr txBox="1">
+            <a:spLocks/>
+          </p:cNvSpPr>
+          <p:nvPr/>
+        </p:nvSpPr>
+        <p:spPr>
+          <a:xfrm>
+            <a:off x="190451" y="1196708"/>
+            <a:ext cx="6232836" cy="3132058"/>
+          </a:xfrm>
+          <a:prstGeom prst="rect">
+            <a:avLst/>
+          </a:prstGeom>
+        </p:spPr>
+        <p:txBody>
+          <a:bodyPr vert="horz" lIns="107972" tIns="35991" rIns="107972" bIns="35991" rtlCol="0">
+            <a:noAutofit/>
+          </a:bodyPr>
+          <a:lstStyle>
+            <a:lvl1pPr marL="360363" indent="-360363" algn="l" defTabSz="1218438" rtl="0" eaLnBrk="1" latinLnBrk="0" hangingPunct="1">
+              <a:lnSpc>
+                <a:spcPct val="105000"/>
+              </a:lnSpc>
+              <a:spcBef>
+                <a:spcPts val="600"/>
+              </a:spcBef>
+              <a:spcAft>
+                <a:spcPts val="600"/>
+              </a:spcAft>
+              <a:buFont typeface="Wingdings" panose="05000000000000000000" pitchFamily="2" charset="2"/>
+              <a:buChar char="§"/>
+              <a:defRPr sz="3398" kern="1200">
+                <a:solidFill>
+                  <a:schemeClr val="tx1"/>
+                </a:solidFill>
+                <a:latin typeface="+mn-lt"/>
+                <a:ea typeface="+mn-ea"/>
+                <a:cs typeface="+mn-cs"/>
+              </a:defRPr>
+            </a:lvl1pPr>
+            <a:lvl2pPr marL="803275" indent="-360363" algn="l" defTabSz="1218438" rtl="0" eaLnBrk="1" latinLnBrk="0" hangingPunct="1">
+              <a:lnSpc>
+                <a:spcPct val="105000"/>
+              </a:lnSpc>
+              <a:spcBef>
+                <a:spcPts val="600"/>
+              </a:spcBef>
+              <a:spcAft>
+                <a:spcPts val="600"/>
+              </a:spcAft>
+              <a:buFont typeface="Wingdings" panose="05000000000000000000" pitchFamily="2" charset="2"/>
+              <a:buChar char="§"/>
+              <a:defRPr sz="3198" kern="1200">
+                <a:solidFill>
+                  <a:schemeClr val="tx1"/>
+                </a:solidFill>
+                <a:latin typeface="+mn-lt"/>
+                <a:ea typeface="+mn-ea"/>
+                <a:cs typeface="+mn-cs"/>
+              </a:defRPr>
+            </a:lvl2pPr>
+            <a:lvl3pPr marL="1255713" indent="-360363" algn="l" defTabSz="1218438" rtl="0" eaLnBrk="1" latinLnBrk="0" hangingPunct="1">
+              <a:lnSpc>
+                <a:spcPct val="105000"/>
+              </a:lnSpc>
+              <a:spcBef>
+                <a:spcPts val="600"/>
+              </a:spcBef>
+              <a:spcAft>
+                <a:spcPts val="600"/>
+              </a:spcAft>
+              <a:buFont typeface="Wingdings" panose="05000000000000000000" pitchFamily="2" charset="2"/>
+              <a:buChar char="§"/>
+              <a:defRPr sz="2998" kern="1200">
+                <a:solidFill>
+                  <a:schemeClr val="tx1"/>
+                </a:solidFill>
+                <a:latin typeface="+mn-lt"/>
+                <a:ea typeface="+mn-ea"/>
+                <a:cs typeface="+mn-cs"/>
+              </a:defRPr>
+            </a:lvl3pPr>
+            <a:lvl4pPr marL="1700213" indent="-352425" algn="l" defTabSz="1218438" rtl="0" eaLnBrk="1" latinLnBrk="0" hangingPunct="1">
+              <a:lnSpc>
+                <a:spcPct val="105000"/>
+              </a:lnSpc>
+              <a:spcBef>
+                <a:spcPts val="600"/>
+              </a:spcBef>
+              <a:spcAft>
+                <a:spcPts val="600"/>
+              </a:spcAft>
+              <a:buFont typeface="Wingdings" panose="05000000000000000000" pitchFamily="2" charset="2"/>
+              <a:buChar char="§"/>
+              <a:defRPr sz="2798" kern="1200">
+                <a:solidFill>
+                  <a:schemeClr val="tx1"/>
+                </a:solidFill>
+                <a:latin typeface="+mn-lt"/>
+                <a:ea typeface="+mn-ea"/>
+                <a:cs typeface="+mn-cs"/>
+              </a:defRPr>
+            </a:lvl4pPr>
+            <a:lvl5pPr marL="2058988" indent="-266700" algn="l" defTabSz="1218438" rtl="0" eaLnBrk="1" latinLnBrk="0" hangingPunct="1">
+              <a:lnSpc>
+                <a:spcPct val="105000"/>
+              </a:lnSpc>
+              <a:spcBef>
+                <a:spcPts val="600"/>
+              </a:spcBef>
+              <a:spcAft>
+                <a:spcPts val="600"/>
+              </a:spcAft>
+              <a:buFont typeface="Wingdings" panose="05000000000000000000" pitchFamily="2" charset="2"/>
+              <a:buChar char="§"/>
+              <a:defRPr sz="2598" kern="1200">
+                <a:solidFill>
+                  <a:schemeClr val="tx1"/>
+                </a:solidFill>
+                <a:latin typeface="+mn-lt"/>
+                <a:ea typeface="+mn-ea"/>
+                <a:cs typeface="+mn-cs"/>
+              </a:defRPr>
+            </a:lvl5pPr>
+            <a:lvl6pPr marL="3350704" indent="-304610" algn="l" defTabSz="1218438" rtl="0" eaLnBrk="1" latinLnBrk="1" hangingPunct="1">
+              <a:spcBef>
+                <a:spcPct val="20000"/>
+              </a:spcBef>
+              <a:buFont typeface="Arial" pitchFamily="34" charset="0"/>
+              <a:buChar char="•"/>
+              <a:defRPr sz="2665" kern="1200">
+                <a:solidFill>
+                  <a:schemeClr val="tx1"/>
+                </a:solidFill>
+                <a:latin typeface="+mn-lt"/>
+                <a:ea typeface="+mn-ea"/>
+                <a:cs typeface="+mn-cs"/>
+              </a:defRPr>
+            </a:lvl6pPr>
+            <a:lvl7pPr marL="3959924" indent="-304610" algn="l" defTabSz="1218438" rtl="0" eaLnBrk="1" latinLnBrk="1" hangingPunct="1">
+              <a:spcBef>
+                <a:spcPct val="20000"/>
+              </a:spcBef>
+              <a:buFont typeface="Arial" pitchFamily="34" charset="0"/>
+              <a:buChar char="•"/>
+              <a:defRPr sz="2665" kern="1200">
+                <a:solidFill>
+                  <a:schemeClr val="tx1"/>
+                </a:solidFill>
+                <a:latin typeface="+mn-lt"/>
+                <a:ea typeface="+mn-ea"/>
+                <a:cs typeface="+mn-cs"/>
+              </a:defRPr>
+            </a:lvl7pPr>
+            <a:lvl8pPr marL="4569143" indent="-304610" algn="l" defTabSz="1218438" rtl="0" eaLnBrk="1" latinLnBrk="1" hangingPunct="1">
+              <a:spcBef>
+                <a:spcPct val="20000"/>
+              </a:spcBef>
+              <a:buFont typeface="Arial" pitchFamily="34" charset="0"/>
+              <a:buChar char="•"/>
+              <a:defRPr sz="2665" kern="1200">
+                <a:solidFill>
+                  <a:schemeClr val="tx1"/>
+                </a:solidFill>
+                <a:latin typeface="+mn-lt"/>
+                <a:ea typeface="+mn-ea"/>
+                <a:cs typeface="+mn-cs"/>
+              </a:defRPr>
+            </a:lvl8pPr>
+            <a:lvl9pPr marL="5178362" indent="-304610" algn="l" defTabSz="1218438" rtl="0" eaLnBrk="1" latinLnBrk="1" hangingPunct="1">
+              <a:spcBef>
+                <a:spcPct val="20000"/>
+              </a:spcBef>
+              <a:buFont typeface="Arial" pitchFamily="34" charset="0"/>
+              <a:buChar char="•"/>
+              <a:defRPr sz="2665" kern="1200">
+                <a:solidFill>
+                  <a:schemeClr val="tx1"/>
+                </a:solidFill>
+                <a:latin typeface="+mn-lt"/>
+                <a:ea typeface="+mn-ea"/>
+                <a:cs typeface="+mn-cs"/>
+              </a:defRPr>
+            </a:lvl9pPr>
+          </a:lstStyle>
+          <a:p>
+            <a:pPr marL="456778" indent="-456778" eaLnBrk="0" hangingPunct="0"/>
+            <a:r>
+              <a:rPr lang="bg-BG" sz="3599" dirty="0"/>
+              <a:t>Циклите в програмирането ни позволяват да </a:t>
+            </a:r>
+            <a:r>
+              <a:rPr lang="bg-BG" sz="3599" b="1" dirty="0">
+                <a:solidFill>
+                  <a:schemeClr val="bg1"/>
+                </a:solidFill>
+              </a:rPr>
+              <a:t>повтаряме</a:t>
+            </a:r>
+            <a:r>
+              <a:rPr lang="bg-BG" sz="3599" dirty="0"/>
+              <a:t> </a:t>
+            </a:r>
+            <a:r>
+              <a:rPr lang="bg-BG" sz="3599" b="1" dirty="0">
+                <a:solidFill>
+                  <a:schemeClr val="bg1"/>
+                </a:solidFill>
+              </a:rPr>
+              <a:t>едни и същи действия </a:t>
+            </a:r>
+            <a:r>
+              <a:rPr lang="bg-BG" sz="3599" dirty="0"/>
+              <a:t>определен брой пъти:</a:t>
+            </a:r>
+          </a:p>
+        </p:txBody>
+      </p:sp>
+      <p:sp>
+        <p:nvSpPr>
+          <p:cNvPr id="11" name="TextBox 29">
+            <a:extLst>
+              <a:ext uri="{FF2B5EF4-FFF2-40B4-BE49-F238E27FC236}">
+                <a16:creationId xmlns:a16="http://schemas.microsoft.com/office/drawing/2014/main" id="{D856292C-764E-4006-AA7A-9896076EBDBC}"/>
+              </a:ext>
+            </a:extLst>
+          </p:cNvPr>
+          <p:cNvSpPr txBox="1"/>
+          <p:nvPr/>
+        </p:nvSpPr>
+        <p:spPr>
+          <a:xfrm>
+            <a:off x="9934919" y="2645567"/>
+            <a:ext cx="809177" cy="510480"/>
+          </a:xfrm>
+          <a:prstGeom prst="rect">
+            <a:avLst/>
+          </a:prstGeom>
+          <a:noFill/>
+          <a:ln>
+            <a:noFill/>
+          </a:ln>
+        </p:spPr>
+        <p:style>
+          <a:lnRef idx="0">
+            <a:scrgbClr r="0" g="0" b="0"/>
+          </a:lnRef>
+          <a:fillRef idx="0">
+            <a:scrgbClr r="0" g="0" b="0"/>
+          </a:fillRef>
+          <a:effectRef idx="0">
+            <a:scrgbClr r="0" g="0" b="0"/>
+          </a:effectRef>
+          <a:fontRef idx="minor">
+            <a:schemeClr val="dk1"/>
+          </a:fontRef>
+        </p:style>
+        <p:txBody>
+          <a:bodyPr vert="horz" wrap="square" lIns="143963" tIns="107972" rIns="143963" bIns="107972" rtlCol="0">
+            <a:spAutoFit/>
+          </a:bodyPr>
+          <a:lstStyle/>
+          <a:p>
+            <a:pPr algn="l" eaLnBrk="0" hangingPunct="0">
+              <a:lnSpc>
+                <a:spcPct val="110000"/>
+              </a:lnSpc>
+              <a:buClr>
+                <a:schemeClr val="accent5">
+                  <a:lumMod val="40000"/>
+                  <a:lumOff val="60000"/>
+                </a:schemeClr>
+              </a:buClr>
+              <a:buSzPct val="70000"/>
+            </a:pPr>
+            <a:r>
+              <a:rPr lang="en-GB" sz="1799" dirty="0"/>
+              <a:t>false</a:t>
+            </a:r>
+            <a:endParaRPr lang="en-US" sz="2399" dirty="0"/>
+          </a:p>
+        </p:txBody>
+      </p:sp>
+      <p:cxnSp>
+        <p:nvCxnSpPr>
+          <p:cNvPr id="12" name="Straight Arrow Connector 30">
+            <a:extLst>
+              <a:ext uri="{FF2B5EF4-FFF2-40B4-BE49-F238E27FC236}">
+                <a16:creationId xmlns:a16="http://schemas.microsoft.com/office/drawing/2014/main" id="{CAAA75DC-A2B8-44FC-A51F-8F637F5B953D}"/>
+              </a:ext>
+            </a:extLst>
+          </p:cNvPr>
+          <p:cNvCxnSpPr>
+            <a:cxnSpLocks/>
+          </p:cNvCxnSpPr>
+          <p:nvPr/>
+        </p:nvCxnSpPr>
+        <p:spPr>
+          <a:xfrm>
+            <a:off x="10042270" y="3154263"/>
+            <a:ext cx="501976" cy="14079"/>
+          </a:xfrm>
+          <a:prstGeom prst="straightConnector1">
+            <a:avLst/>
+          </a:prstGeom>
+          <a:ln w="57150">
+            <a:tailEnd type="triangle"/>
+          </a:ln>
+        </p:spPr>
+        <p:style>
+          <a:lnRef idx="1">
+            <a:schemeClr val="accent1"/>
+          </a:lnRef>
+          <a:fillRef idx="0">
+            <a:schemeClr val="accent1"/>
+          </a:fillRef>
+          <a:effectRef idx="0">
+            <a:schemeClr val="accent1"/>
+          </a:effectRef>
+          <a:fontRef idx="minor">
+            <a:schemeClr val="tx1"/>
+          </a:fontRef>
+        </p:style>
+      </p:cxnSp>
+      <p:sp>
+        <p:nvSpPr>
+          <p:cNvPr id="13" name="Rectangle 32">
+            <a:extLst>
+              <a:ext uri="{FF2B5EF4-FFF2-40B4-BE49-F238E27FC236}">
+                <a16:creationId xmlns:a16="http://schemas.microsoft.com/office/drawing/2014/main" id="{D32010D8-1060-4692-A438-50B938022991}"/>
+              </a:ext>
+            </a:extLst>
+          </p:cNvPr>
+          <p:cNvSpPr/>
+          <p:nvPr/>
+        </p:nvSpPr>
+        <p:spPr bwMode="auto">
+          <a:xfrm>
+            <a:off x="8410061" y="4179374"/>
+            <a:ext cx="1620919" cy="551809"/>
+          </a:xfrm>
+          <a:prstGeom prst="rect">
+            <a:avLst/>
+          </a:prstGeom>
+          <a:solidFill>
+            <a:schemeClr val="dk2">
+              <a:alpha val="80000"/>
+            </a:schemeClr>
+          </a:solidFill>
+          <a:ln w="19050">
+            <a:solidFill>
+              <a:schemeClr val="tx1">
+                <a:lumMod val="75000"/>
+                <a:alpha val="80000"/>
+              </a:schemeClr>
+            </a:solidFill>
+          </a:ln>
+          <a:effectLst/>
+        </p:spPr>
+        <p:style>
+          <a:lnRef idx="2">
+            <a:schemeClr val="accent1">
+              <a:shade val="50000"/>
+            </a:schemeClr>
+          </a:lnRef>
+          <a:fillRef idx="1001">
+            <a:schemeClr val="dk2"/>
+          </a:fillRef>
+          <a:effectRef idx="0">
+            <a:schemeClr val="accent1"/>
+          </a:effectRef>
+          <a:fontRef idx="minor">
+            <a:schemeClr val="lt1"/>
+          </a:fontRef>
+        </p:style>
+        <p:txBody>
+          <a:bodyPr rot="0" spcFirstLastPara="0" vertOverflow="overflow" horzOverflow="overflow" vert="horz" wrap="square" lIns="91416" tIns="45708" rIns="91416" bIns="45708" numCol="1" spcCol="0" rtlCol="0" fromWordArt="0" anchor="ctr" anchorCtr="0" forceAA="0" compatLnSpc="1">
+            <a:prstTxWarp prst="textNoShape">
+              <a:avLst/>
+            </a:prstTxWarp>
+            <a:noAutofit/>
+          </a:bodyPr>
+          <a:lstStyle/>
+          <a:p>
+            <a:pPr algn="ctr"/>
+            <a:endParaRPr lang="bg-BG" sz="2799" b="1" dirty="0">
+              <a:solidFill>
+                <a:srgbClr val="FFFFFF"/>
+              </a:solidFill>
+              <a:effectLst>
+                <a:outerShdw blurRad="38100" dist="38100" dir="2700000" algn="tl">
+                  <a:srgbClr val="000000">
+                    <a:alpha val="43137"/>
+                  </a:srgbClr>
+                </a:outerShdw>
+              </a:effectLst>
+            </a:endParaRPr>
+          </a:p>
+        </p:txBody>
+      </p:sp>
+      <p:sp>
+        <p:nvSpPr>
+          <p:cNvPr id="14" name="TextBox 33">
+            <a:extLst>
+              <a:ext uri="{FF2B5EF4-FFF2-40B4-BE49-F238E27FC236}">
+                <a16:creationId xmlns:a16="http://schemas.microsoft.com/office/drawing/2014/main" id="{BF690F1C-9F81-406D-A4E3-BAFCEF27E02B}"/>
+              </a:ext>
+            </a:extLst>
+          </p:cNvPr>
+          <p:cNvSpPr txBox="1"/>
+          <p:nvPr/>
+        </p:nvSpPr>
+        <p:spPr>
+          <a:xfrm>
+            <a:off x="8410061" y="4179373"/>
+            <a:ext cx="1620919" cy="581685"/>
+          </a:xfrm>
+          <a:prstGeom prst="rect">
+            <a:avLst/>
+          </a:prstGeom>
+          <a:noFill/>
+          <a:ln w="12700">
+            <a:noFill/>
+          </a:ln>
+        </p:spPr>
+        <p:txBody>
+          <a:bodyPr vert="horz" wrap="square" lIns="143963" tIns="107972" rIns="143963" bIns="107972" rtlCol="0">
+            <a:spAutoFit/>
+          </a:bodyPr>
+          <a:lstStyle/>
+          <a:p>
+            <a:pPr algn="ctr" eaLnBrk="0" hangingPunct="0">
+              <a:buClr>
+                <a:schemeClr val="accent5">
+                  <a:lumMod val="40000"/>
+                  <a:lumOff val="60000"/>
+                </a:schemeClr>
+              </a:buClr>
+              <a:buSzPct val="70000"/>
+            </a:pPr>
+            <a:r>
+              <a:rPr lang="en-US" sz="2000" b="1" dirty="0">
+                <a:solidFill>
+                  <a:schemeClr val="bg2"/>
+                </a:solidFill>
+                <a:latin typeface="+mj-lt"/>
+              </a:rPr>
+              <a:t>Print</a:t>
+            </a:r>
+            <a:r>
+              <a:rPr lang="en-US" sz="2399" b="1" dirty="0">
+                <a:solidFill>
+                  <a:schemeClr val="bg2"/>
+                </a:solidFill>
+                <a:latin typeface="+mj-lt"/>
+              </a:rPr>
+              <a:t> </a:t>
+            </a:r>
+            <a:r>
+              <a:rPr lang="en-US" sz="2399" b="1" noProof="1">
+                <a:solidFill>
+                  <a:schemeClr val="bg2"/>
+                </a:solidFill>
+                <a:latin typeface="Consolas" pitchFamily="49" charset="0"/>
+              </a:rPr>
+              <a:t>i</a:t>
+            </a:r>
+            <a:endParaRPr lang="en-US" sz="2399" b="1" dirty="0">
+              <a:solidFill>
+                <a:schemeClr val="bg2"/>
+              </a:solidFill>
+              <a:latin typeface="Consolas" pitchFamily="49" charset="0"/>
+            </a:endParaRPr>
+          </a:p>
+        </p:txBody>
+      </p:sp>
+      <p:sp>
+        <p:nvSpPr>
+          <p:cNvPr id="16" name="TextBox 36">
+            <a:extLst>
+              <a:ext uri="{FF2B5EF4-FFF2-40B4-BE49-F238E27FC236}">
+                <a16:creationId xmlns:a16="http://schemas.microsoft.com/office/drawing/2014/main" id="{951D766D-A451-4072-A48C-3FE65D7D0FE7}"/>
+              </a:ext>
+            </a:extLst>
+          </p:cNvPr>
+          <p:cNvSpPr txBox="1"/>
+          <p:nvPr/>
+        </p:nvSpPr>
+        <p:spPr>
+          <a:xfrm>
+            <a:off x="9270052" y="3629115"/>
+            <a:ext cx="700740" cy="534384"/>
+          </a:xfrm>
+          <a:prstGeom prst="rect">
+            <a:avLst/>
+          </a:prstGeom>
+          <a:noFill/>
+          <a:ln>
+            <a:noFill/>
+          </a:ln>
+        </p:spPr>
+        <p:style>
+          <a:lnRef idx="0">
+            <a:scrgbClr r="0" g="0" b="0"/>
+          </a:lnRef>
+          <a:fillRef idx="0">
+            <a:scrgbClr r="0" g="0" b="0"/>
+          </a:fillRef>
+          <a:effectRef idx="0">
+            <a:scrgbClr r="0" g="0" b="0"/>
+          </a:effectRef>
+          <a:fontRef idx="minor">
+            <a:schemeClr val="dk1"/>
+          </a:fontRef>
+        </p:style>
+        <p:txBody>
+          <a:bodyPr vert="horz" wrap="none" lIns="143963" tIns="107972" rIns="143963" bIns="107972" rtlCol="0">
+            <a:spAutoFit/>
+          </a:bodyPr>
+          <a:lstStyle/>
+          <a:p>
+            <a:pPr algn="l" eaLnBrk="0" hangingPunct="0">
+              <a:lnSpc>
+                <a:spcPct val="110000"/>
+              </a:lnSpc>
+              <a:buClr>
+                <a:schemeClr val="accent5">
+                  <a:lumMod val="40000"/>
+                  <a:lumOff val="60000"/>
+                </a:schemeClr>
+              </a:buClr>
+              <a:buSzPct val="70000"/>
+            </a:pPr>
+            <a:r>
+              <a:rPr lang="en-GB" sz="1999" dirty="0"/>
+              <a:t>true</a:t>
+            </a:r>
+            <a:endParaRPr lang="en-US" sz="2399" dirty="0"/>
+          </a:p>
+        </p:txBody>
+      </p:sp>
+      <p:sp>
+        <p:nvSpPr>
+          <p:cNvPr id="17" name="Flowchart: Terminator 37">
+            <a:extLst>
+              <a:ext uri="{FF2B5EF4-FFF2-40B4-BE49-F238E27FC236}">
+                <a16:creationId xmlns:a16="http://schemas.microsoft.com/office/drawing/2014/main" id="{A9EF680E-9948-4FE3-854F-9DEF77CFBBA1}"/>
+              </a:ext>
+            </a:extLst>
+          </p:cNvPr>
+          <p:cNvSpPr/>
+          <p:nvPr/>
+        </p:nvSpPr>
+        <p:spPr bwMode="auto">
+          <a:xfrm>
+            <a:off x="10586318" y="2906173"/>
+            <a:ext cx="1525181" cy="510260"/>
+          </a:xfrm>
+          <a:prstGeom prst="flowChartTerminator">
+            <a:avLst/>
+          </a:prstGeom>
+          <a:solidFill>
+            <a:schemeClr val="dk2">
+              <a:alpha val="80000"/>
+            </a:schemeClr>
+          </a:solidFill>
+          <a:ln w="19050">
+            <a:solidFill>
+              <a:schemeClr val="tx1">
+                <a:lumMod val="75000"/>
+                <a:alpha val="80000"/>
+              </a:schemeClr>
+            </a:solidFill>
+          </a:ln>
+          <a:effectLst/>
+        </p:spPr>
+        <p:style>
+          <a:lnRef idx="2">
+            <a:schemeClr val="accent1">
+              <a:shade val="50000"/>
+            </a:schemeClr>
+          </a:lnRef>
+          <a:fillRef idx="1001">
+            <a:schemeClr val="dk2"/>
+          </a:fillRef>
+          <a:effectRef idx="0">
+            <a:schemeClr val="accent1"/>
+          </a:effectRef>
+          <a:fontRef idx="minor">
+            <a:schemeClr val="lt1"/>
+          </a:fontRef>
+        </p:style>
+        <p:txBody>
+          <a:bodyPr rot="0" spcFirstLastPara="0" vertOverflow="overflow" horzOverflow="overflow" vert="horz" wrap="square" lIns="91416" tIns="45708" rIns="91416" bIns="45708" numCol="1" spcCol="0" rtlCol="0" fromWordArt="0" anchor="ctr" anchorCtr="0" forceAA="0" compatLnSpc="1">
+            <a:prstTxWarp prst="textNoShape">
+              <a:avLst/>
+            </a:prstTxWarp>
+            <a:noAutofit/>
+          </a:bodyPr>
+          <a:lstStyle/>
+          <a:p>
+            <a:pPr algn="ctr"/>
+            <a:r>
+              <a:rPr lang="en-GB" sz="1999" b="1" dirty="0">
+                <a:solidFill>
+                  <a:srgbClr val="FFFFFF"/>
+                </a:solidFill>
+              </a:rPr>
+              <a:t>End loop</a:t>
+            </a:r>
+            <a:endParaRPr lang="en-US" sz="1999" b="1" dirty="0">
+              <a:solidFill>
+                <a:srgbClr val="FFFFFF"/>
+              </a:solidFill>
+            </a:endParaRPr>
+          </a:p>
+        </p:txBody>
+      </p:sp>
+      <p:sp>
+        <p:nvSpPr>
+          <p:cNvPr id="18" name="Rectangle 19">
+            <a:extLst>
+              <a:ext uri="{FF2B5EF4-FFF2-40B4-BE49-F238E27FC236}">
+                <a16:creationId xmlns:a16="http://schemas.microsoft.com/office/drawing/2014/main" id="{D2E604F1-154B-4CF2-80CA-54F0EB2874CE}"/>
+              </a:ext>
+            </a:extLst>
+          </p:cNvPr>
+          <p:cNvSpPr/>
+          <p:nvPr/>
+        </p:nvSpPr>
+        <p:spPr bwMode="auto">
+          <a:xfrm>
+            <a:off x="8410061" y="1629000"/>
+            <a:ext cx="1620919" cy="551809"/>
+          </a:xfrm>
+          <a:prstGeom prst="rect">
+            <a:avLst/>
+          </a:prstGeom>
+          <a:solidFill>
+            <a:schemeClr val="dk2">
+              <a:alpha val="80000"/>
+            </a:schemeClr>
+          </a:solidFill>
+          <a:ln w="19050">
+            <a:solidFill>
+              <a:schemeClr val="tx1">
+                <a:lumMod val="75000"/>
+                <a:alpha val="80000"/>
+              </a:schemeClr>
+            </a:solidFill>
+          </a:ln>
+          <a:effectLst/>
+        </p:spPr>
+        <p:style>
+          <a:lnRef idx="2">
+            <a:schemeClr val="accent1">
+              <a:shade val="50000"/>
+            </a:schemeClr>
+          </a:lnRef>
+          <a:fillRef idx="1001">
+            <a:schemeClr val="dk2"/>
+          </a:fillRef>
+          <a:effectRef idx="0">
+            <a:schemeClr val="accent1"/>
+          </a:effectRef>
+          <a:fontRef idx="minor">
+            <a:schemeClr val="lt1"/>
+          </a:fontRef>
+        </p:style>
+        <p:txBody>
+          <a:bodyPr rot="0" spcFirstLastPara="0" vertOverflow="overflow" horzOverflow="overflow" vert="horz" wrap="square" lIns="91416" tIns="45708" rIns="91416" bIns="45708" numCol="1" spcCol="0" rtlCol="0" fromWordArt="0" anchor="ctr" anchorCtr="0" forceAA="0" compatLnSpc="1">
+            <a:prstTxWarp prst="textNoShape">
+              <a:avLst/>
+            </a:prstTxWarp>
+            <a:noAutofit/>
+          </a:bodyPr>
+          <a:lstStyle/>
+          <a:p>
+            <a:pPr algn="ctr"/>
+            <a:endParaRPr lang="bg-BG" sz="2799" b="1" dirty="0">
+              <a:solidFill>
+                <a:srgbClr val="FFFFFF"/>
+              </a:solidFill>
+              <a:effectLst>
+                <a:outerShdw blurRad="38100" dist="38100" dir="2700000" algn="tl">
+                  <a:srgbClr val="000000">
+                    <a:alpha val="43137"/>
+                  </a:srgbClr>
+                </a:outerShdw>
+              </a:effectLst>
+            </a:endParaRPr>
+          </a:p>
+        </p:txBody>
+      </p:sp>
+      <p:sp>
+        <p:nvSpPr>
+          <p:cNvPr id="19" name="TextBox 20">
+            <a:extLst>
+              <a:ext uri="{FF2B5EF4-FFF2-40B4-BE49-F238E27FC236}">
+                <a16:creationId xmlns:a16="http://schemas.microsoft.com/office/drawing/2014/main" id="{DBBF4751-629A-4C32-8E8B-058F5C6EC611}"/>
+              </a:ext>
+            </a:extLst>
+          </p:cNvPr>
+          <p:cNvSpPr txBox="1"/>
+          <p:nvPr/>
+        </p:nvSpPr>
+        <p:spPr>
+          <a:xfrm>
+            <a:off x="8410061" y="1640444"/>
+            <a:ext cx="1620918" cy="528923"/>
+          </a:xfrm>
+          <a:prstGeom prst="rect">
+            <a:avLst/>
+          </a:prstGeom>
+          <a:noFill/>
+          <a:ln w="12700">
+            <a:noFill/>
+          </a:ln>
+        </p:spPr>
+        <p:txBody>
+          <a:bodyPr vert="horz" wrap="square" lIns="143963" tIns="107972" rIns="143963" bIns="107972" rtlCol="0">
+            <a:spAutoFit/>
+          </a:bodyPr>
+          <a:lstStyle/>
+          <a:p>
+            <a:pPr algn="ctr" eaLnBrk="0" hangingPunct="0">
+              <a:buClr>
+                <a:schemeClr val="accent5">
+                  <a:lumMod val="40000"/>
+                  <a:lumOff val="60000"/>
+                </a:schemeClr>
+              </a:buClr>
+              <a:buSzPct val="70000"/>
+            </a:pPr>
+            <a:r>
+              <a:rPr lang="en-US" sz="1999" b="1" noProof="1">
+                <a:solidFill>
+                  <a:schemeClr val="bg2"/>
+                </a:solidFill>
+                <a:latin typeface="Consolas" pitchFamily="49" charset="0"/>
+              </a:rPr>
+              <a:t>i</a:t>
+            </a:r>
+            <a:r>
+              <a:rPr lang="en-US" sz="1999" b="1" dirty="0">
+                <a:solidFill>
+                  <a:schemeClr val="bg2"/>
+                </a:solidFill>
+                <a:latin typeface="Consolas" pitchFamily="49" charset="0"/>
+              </a:rPr>
+              <a:t> = </a:t>
+            </a:r>
+            <a:r>
+              <a:rPr lang="en-US" sz="1999" b="1" noProof="1">
+                <a:solidFill>
+                  <a:schemeClr val="bg2"/>
+                </a:solidFill>
+                <a:latin typeface="Consolas" pitchFamily="49" charset="0"/>
+              </a:rPr>
+              <a:t>1</a:t>
+            </a:r>
+            <a:endParaRPr lang="bg-BG" sz="1999" b="1" noProof="1">
+              <a:solidFill>
+                <a:schemeClr val="bg2"/>
+              </a:solidFill>
+              <a:latin typeface="Consolas" pitchFamily="49" charset="0"/>
+            </a:endParaRPr>
+          </a:p>
+        </p:txBody>
+      </p:sp>
       <p:grpSp>
         <p:nvGrpSpPr>
-          <p:cNvPr id="3" name="Групиране 8">
+          <p:cNvPr id="5" name="Групиране 19">
             <a:extLst>
               <a:ext uri="{FF2B5EF4-FFF2-40B4-BE49-F238E27FC236}">
-                <a16:creationId xmlns:a16="http://schemas.microsoft.com/office/drawing/2014/main" id="{C05940CC-C6DB-42F4-8ECD-95D6D8C5E859}"/>
+                <a16:creationId xmlns:a16="http://schemas.microsoft.com/office/drawing/2014/main" id="{8AEC38A1-D6C5-4A74-9A8B-898BFC67440A}"/>
               </a:ext>
             </a:extLst>
           </p:cNvPr>
@@ -39188,124 +40426,18 @@
         </p:nvGrpSpPr>
         <p:grpSpPr>
           <a:xfrm>
-            <a:off x="7941000" y="1494000"/>
-            <a:ext cx="3714950" cy="3132058"/>
-            <a:chOff x="1562100" y="2659188"/>
-            <a:chExt cx="4818290" cy="3409372"/>
+            <a:off x="8474951" y="2645549"/>
+            <a:ext cx="1525180" cy="1031511"/>
+            <a:chOff x="2010580" y="3962382"/>
+            <a:chExt cx="1806822" cy="1025587"/>
           </a:xfrm>
         </p:grpSpPr>
         <p:sp>
           <p:nvSpPr>
-            <p:cNvPr id="11" name="TextBox 29">
+            <p:cNvPr id="23" name="Flowchart: Decision 22">
               <a:extLst>
                 <a:ext uri="{FF2B5EF4-FFF2-40B4-BE49-F238E27FC236}">
-                  <a16:creationId xmlns:a16="http://schemas.microsoft.com/office/drawing/2014/main" id="{D856292C-764E-4006-AA7A-9896076EBDBC}"/>
-                </a:ext>
-              </a:extLst>
-            </p:cNvPr>
-            <p:cNvSpPr txBox="1"/>
-            <p:nvPr/>
-          </p:nvSpPr>
-          <p:spPr>
-            <a:xfrm>
-              <a:off x="3557369" y="3765762"/>
-              <a:ext cx="1049503" cy="555678"/>
-            </a:xfrm>
-            <a:prstGeom prst="rect">
-              <a:avLst/>
-            </a:prstGeom>
-            <a:noFill/>
-            <a:ln>
-              <a:noFill/>
-            </a:ln>
-          </p:spPr>
-          <p:style>
-            <a:lnRef idx="0">
-              <a:scrgbClr r="0" g="0" b="0"/>
-            </a:lnRef>
-            <a:fillRef idx="0">
-              <a:scrgbClr r="0" g="0" b="0"/>
-            </a:fillRef>
-            <a:effectRef idx="0">
-              <a:scrgbClr r="0" g="0" b="0"/>
-            </a:effectRef>
-            <a:fontRef idx="minor">
-              <a:schemeClr val="dk1"/>
-            </a:fontRef>
-          </p:style>
-          <p:txBody>
-            <a:bodyPr vert="horz" wrap="square" lIns="143963" tIns="107972" rIns="143963" bIns="107972" rtlCol="0">
-              <a:spAutoFit/>
-            </a:bodyPr>
-            <a:lstStyle/>
-            <a:p>
-              <a:pPr algn="l" eaLnBrk="0" hangingPunct="0">
-                <a:lnSpc>
-                  <a:spcPct val="110000"/>
-                </a:lnSpc>
-                <a:buClr>
-                  <a:schemeClr val="accent5">
-                    <a:lumMod val="40000"/>
-                    <a:lumOff val="60000"/>
-                  </a:schemeClr>
-                </a:buClr>
-                <a:buSzPct val="70000"/>
-              </a:pPr>
-              <a:r>
-                <a:rPr lang="en-GB" sz="1799" dirty="0"/>
-                <a:t>false</a:t>
-              </a:r>
-              <a:endParaRPr lang="en-US" sz="2399" dirty="0"/>
-            </a:p>
-          </p:txBody>
-        </p:sp>
-        <p:cxnSp>
-          <p:nvCxnSpPr>
-            <p:cNvPr id="12" name="Straight Arrow Connector 30">
-              <a:extLst>
-                <a:ext uri="{FF2B5EF4-FFF2-40B4-BE49-F238E27FC236}">
-                  <a16:creationId xmlns:a16="http://schemas.microsoft.com/office/drawing/2014/main" id="{CAAA75DC-A2B8-44FC-A51F-8F637F5B953D}"/>
-                </a:ext>
-              </a:extLst>
-            </p:cNvPr>
-            <p:cNvCxnSpPr>
-              <a:cxnSpLocks/>
-            </p:cNvCxnSpPr>
-            <p:nvPr/>
-          </p:nvCxnSpPr>
-          <p:spPr>
-            <a:xfrm>
-              <a:off x="3696600" y="4319500"/>
-              <a:ext cx="651063" cy="15326"/>
-            </a:xfrm>
-            <a:prstGeom prst="straightConnector1">
-              <a:avLst/>
-            </a:prstGeom>
-            <a:ln w="57150">
-              <a:tailEnd type="triangle"/>
-            </a:ln>
-          </p:spPr>
-          <p:style>
-            <a:lnRef idx="1">
-              <a:schemeClr val="accent1"/>
-            </a:lnRef>
-            <a:fillRef idx="0">
-              <a:schemeClr val="accent1"/>
-            </a:fillRef>
-            <a:effectRef idx="0">
-              <a:schemeClr val="accent1"/>
-            </a:effectRef>
-            <a:fontRef idx="minor">
-              <a:schemeClr val="tx1"/>
-            </a:fontRef>
-          </p:style>
-        </p:cxnSp>
-        <p:sp>
-          <p:nvSpPr>
-            <p:cNvPr id="13" name="Rectangle 32">
-              <a:extLst>
-                <a:ext uri="{FF2B5EF4-FFF2-40B4-BE49-F238E27FC236}">
-                  <a16:creationId xmlns:a16="http://schemas.microsoft.com/office/drawing/2014/main" id="{D32010D8-1060-4692-A438-50B938022991}"/>
+                  <a16:creationId xmlns:a16="http://schemas.microsoft.com/office/drawing/2014/main" id="{346C756F-FFAD-40AC-9353-E6B881B9E394}"/>
                 </a:ext>
               </a:extLst>
             </p:cNvPr>
@@ -39314,10 +40446,10 @@
           </p:nvSpPr>
           <p:spPr bwMode="auto">
             <a:xfrm>
-              <a:off x="1579625" y="5435371"/>
-              <a:ext cx="2102332" cy="600666"/>
+              <a:off x="2010580" y="3962382"/>
+              <a:ext cx="1806822" cy="1025587"/>
             </a:xfrm>
-            <a:prstGeom prst="rect">
+            <a:prstGeom prst="flowChartDecision">
               <a:avLst/>
             </a:prstGeom>
             <a:solidFill>
@@ -39361,9 +40493,9 @@
             <a:lstStyle/>
             <a:p>
               <a:pPr algn="ctr"/>
-              <a:endParaRPr lang="bg-BG" sz="2799" b="1" dirty="0">
-                <a:solidFill>
-                  <a:srgbClr val="FFFFFF"/>
+              <a:endParaRPr lang="en-US" sz="1799" dirty="0">
+                <a:solidFill>
+                  <a:schemeClr val="bg2"/>
                 </a:solidFill>
                 <a:effectLst>
                   <a:outerShdw blurRad="38100" dist="38100" dir="2700000" algn="tl">
@@ -39378,391 +40510,32 @@
         </p:sp>
         <p:sp>
           <p:nvSpPr>
-            <p:cNvPr id="14" name="TextBox 33">
+            <p:cNvPr id="24" name="Rectangle 23">
               <a:extLst>
                 <a:ext uri="{FF2B5EF4-FFF2-40B4-BE49-F238E27FC236}">
-                  <a16:creationId xmlns:a16="http://schemas.microsoft.com/office/drawing/2014/main" id="{BF690F1C-9F81-406D-A4E3-BAFCEF27E02B}"/>
-                </a:ext>
-              </a:extLst>
-            </p:cNvPr>
-            <p:cNvSpPr txBox="1"/>
-            <p:nvPr/>
-          </p:nvSpPr>
-          <p:spPr>
-            <a:xfrm>
-              <a:off x="1579625" y="5435372"/>
-              <a:ext cx="2102332" cy="633188"/>
-            </a:xfrm>
-            <a:prstGeom prst="rect">
-              <a:avLst/>
-            </a:prstGeom>
-            <a:noFill/>
-            <a:ln w="12700">
-              <a:noFill/>
-            </a:ln>
-          </p:spPr>
-          <p:txBody>
-            <a:bodyPr vert="horz" wrap="square" lIns="143963" tIns="107972" rIns="143963" bIns="107972" rtlCol="0">
-              <a:spAutoFit/>
-            </a:bodyPr>
-            <a:lstStyle/>
-            <a:p>
-              <a:pPr algn="ctr" eaLnBrk="0" hangingPunct="0">
-                <a:buClr>
-                  <a:schemeClr val="accent5">
-                    <a:lumMod val="40000"/>
-                    <a:lumOff val="60000"/>
-                  </a:schemeClr>
-                </a:buClr>
-                <a:buSzPct val="70000"/>
-              </a:pPr>
-              <a:r>
-                <a:rPr lang="en-US" sz="2000" b="1" dirty="0">
-                  <a:solidFill>
-                    <a:schemeClr val="bg2"/>
-                  </a:solidFill>
-                  <a:latin typeface="+mj-lt"/>
-                </a:rPr>
-                <a:t>Print</a:t>
-              </a:r>
-              <a:r>
-                <a:rPr lang="en-US" sz="2399" b="1" dirty="0">
-                  <a:solidFill>
-                    <a:schemeClr val="bg2"/>
-                  </a:solidFill>
-                  <a:latin typeface="+mj-lt"/>
-                </a:rPr>
-                <a:t> </a:t>
-              </a:r>
-              <a:r>
-                <a:rPr lang="en-US" sz="2399" b="1" noProof="1">
-                  <a:solidFill>
-                    <a:schemeClr val="bg2"/>
-                  </a:solidFill>
-                  <a:latin typeface="Consolas" pitchFamily="49" charset="0"/>
-                </a:rPr>
-                <a:t>i</a:t>
-              </a:r>
-              <a:r>
-                <a:rPr lang="bg-BG" sz="2399" b="1" dirty="0">
-                  <a:solidFill>
-                    <a:schemeClr val="bg2"/>
-                  </a:solidFill>
-                  <a:latin typeface="Consolas" pitchFamily="49" charset="0"/>
-                </a:rPr>
-                <a:t>+=1</a:t>
-              </a:r>
-              <a:endParaRPr lang="en-US" sz="2399" b="1" dirty="0">
-                <a:solidFill>
-                  <a:schemeClr val="bg2"/>
-                </a:solidFill>
-                <a:latin typeface="Consolas" pitchFamily="49" charset="0"/>
-              </a:endParaRPr>
-            </a:p>
-          </p:txBody>
-        </p:sp>
-        <p:cxnSp>
-          <p:nvCxnSpPr>
-            <p:cNvPr id="15" name="Elbow Connector 37">
-              <a:extLst>
-                <a:ext uri="{FF2B5EF4-FFF2-40B4-BE49-F238E27FC236}">
-                  <a16:creationId xmlns:a16="http://schemas.microsoft.com/office/drawing/2014/main" id="{B8142F72-B791-4148-9AAC-32D08EF34284}"/>
-                </a:ext>
-              </a:extLst>
-            </p:cNvPr>
-            <p:cNvCxnSpPr>
-              <a:cxnSpLocks/>
-            </p:cNvCxnSpPr>
-            <p:nvPr/>
-          </p:nvCxnSpPr>
-          <p:spPr>
-            <a:xfrm rot="10800000" flipH="1">
-              <a:off x="1562100" y="4324888"/>
-              <a:ext cx="42148" cy="1478734"/>
-            </a:xfrm>
-            <a:prstGeom prst="bentConnector4">
-              <a:avLst>
-                <a:gd name="adj1" fmla="val -684202"/>
-                <a:gd name="adj2" fmla="val 101181"/>
-              </a:avLst>
-            </a:prstGeom>
-            <a:ln w="57150">
-              <a:tailEnd type="triangle"/>
-            </a:ln>
-          </p:spPr>
-          <p:style>
-            <a:lnRef idx="1">
-              <a:schemeClr val="accent1"/>
-            </a:lnRef>
-            <a:fillRef idx="0">
-              <a:schemeClr val="accent1"/>
-            </a:fillRef>
-            <a:effectRef idx="0">
-              <a:schemeClr val="accent1"/>
-            </a:effectRef>
-            <a:fontRef idx="minor">
-              <a:schemeClr val="tx1"/>
-            </a:fontRef>
-          </p:style>
-        </p:cxnSp>
-        <p:sp>
-          <p:nvSpPr>
-            <p:cNvPr id="16" name="TextBox 36">
-              <a:extLst>
-                <a:ext uri="{FF2B5EF4-FFF2-40B4-BE49-F238E27FC236}">
-                  <a16:creationId xmlns:a16="http://schemas.microsoft.com/office/drawing/2014/main" id="{951D766D-A451-4072-A48C-3FE65D7D0FE7}"/>
-                </a:ext>
-              </a:extLst>
-            </p:cNvPr>
-            <p:cNvSpPr txBox="1"/>
-            <p:nvPr/>
-          </p:nvSpPr>
-          <p:spPr>
-            <a:xfrm>
-              <a:off x="2695034" y="4836394"/>
-              <a:ext cx="908860" cy="581699"/>
-            </a:xfrm>
-            <a:prstGeom prst="rect">
-              <a:avLst/>
-            </a:prstGeom>
-            <a:noFill/>
-            <a:ln>
-              <a:noFill/>
-            </a:ln>
-          </p:spPr>
-          <p:style>
-            <a:lnRef idx="0">
-              <a:scrgbClr r="0" g="0" b="0"/>
-            </a:lnRef>
-            <a:fillRef idx="0">
-              <a:scrgbClr r="0" g="0" b="0"/>
-            </a:fillRef>
-            <a:effectRef idx="0">
-              <a:scrgbClr r="0" g="0" b="0"/>
-            </a:effectRef>
-            <a:fontRef idx="minor">
-              <a:schemeClr val="dk1"/>
-            </a:fontRef>
-          </p:style>
-          <p:txBody>
-            <a:bodyPr vert="horz" wrap="none" lIns="143963" tIns="107972" rIns="143963" bIns="107972" rtlCol="0">
-              <a:spAutoFit/>
-            </a:bodyPr>
-            <a:lstStyle/>
-            <a:p>
-              <a:pPr algn="l" eaLnBrk="0" hangingPunct="0">
-                <a:lnSpc>
-                  <a:spcPct val="110000"/>
-                </a:lnSpc>
-                <a:buClr>
-                  <a:schemeClr val="accent5">
-                    <a:lumMod val="40000"/>
-                    <a:lumOff val="60000"/>
-                  </a:schemeClr>
-                </a:buClr>
-                <a:buSzPct val="70000"/>
-              </a:pPr>
-              <a:r>
-                <a:rPr lang="en-GB" sz="1999" dirty="0"/>
-                <a:t>true</a:t>
-              </a:r>
-              <a:endParaRPr lang="en-US" sz="2399" dirty="0"/>
-            </a:p>
-          </p:txBody>
-        </p:sp>
-        <p:sp>
-          <p:nvSpPr>
-            <p:cNvPr id="17" name="Flowchart: Terminator 37">
-              <a:extLst>
-                <a:ext uri="{FF2B5EF4-FFF2-40B4-BE49-F238E27FC236}">
-                  <a16:creationId xmlns:a16="http://schemas.microsoft.com/office/drawing/2014/main" id="{A9EF680E-9948-4FE3-854F-9DEF77CFBBA1}"/>
+                  <a16:creationId xmlns:a16="http://schemas.microsoft.com/office/drawing/2014/main" id="{25C1882C-3B72-4189-9327-D11081D6E9A1}"/>
                 </a:ext>
               </a:extLst>
             </p:cNvPr>
             <p:cNvSpPr/>
             <p:nvPr/>
           </p:nvSpPr>
-          <p:spPr bwMode="auto">
+          <p:spPr>
             <a:xfrm>
-              <a:off x="4402230" y="4049443"/>
-              <a:ext cx="1978160" cy="555439"/>
+              <a:off x="2055450" y="4244343"/>
+              <a:ext cx="1717081" cy="393788"/>
             </a:xfrm>
-            <a:prstGeom prst="flowChartTerminator">
+            <a:prstGeom prst="rect">
               <a:avLst/>
             </a:prstGeom>
-            <a:solidFill>
-              <a:schemeClr val="dk2">
-                <a:alpha val="80000"/>
-              </a:schemeClr>
-            </a:solidFill>
-            <a:ln w="19050">
-              <a:solidFill>
-                <a:schemeClr val="tx1">
-                  <a:lumMod val="75000"/>
-                  <a:alpha val="80000"/>
-                </a:schemeClr>
-              </a:solidFill>
-            </a:ln>
-            <a:effectLst/>
           </p:spPr>
-          <p:style>
-            <a:lnRef idx="2">
-              <a:schemeClr val="accent1">
-                <a:shade val="50000"/>
-              </a:schemeClr>
-            </a:lnRef>
-            <a:fillRef idx="1001">
-              <a:schemeClr val="dk2"/>
-            </a:fillRef>
-            <a:effectRef idx="0">
-              <a:schemeClr val="accent1"/>
-            </a:effectRef>
-            <a:fontRef idx="minor">
-              <a:schemeClr val="lt1"/>
-            </a:fontRef>
-          </p:style>
           <p:txBody>
-            <a:bodyPr rot="0" spcFirstLastPara="0" vertOverflow="overflow" horzOverflow="overflow" vert="horz" wrap="square" lIns="91416" tIns="45708" rIns="91416" bIns="45708" numCol="1" spcCol="0" rtlCol="0" fromWordArt="0" anchor="ctr" anchorCtr="0" forceAA="0" compatLnSpc="1">
-              <a:prstTxWarp prst="textNoShape">
-                <a:avLst/>
-              </a:prstTxWarp>
-              <a:noAutofit/>
+            <a:bodyPr wrap="square">
+              <a:spAutoFit/>
             </a:bodyPr>
             <a:lstStyle/>
             <a:p>
               <a:pPr algn="ctr"/>
-              <a:r>
-                <a:rPr lang="en-GB" sz="1999" b="1" dirty="0">
-                  <a:solidFill>
-                    <a:srgbClr val="FFFFFF"/>
-                  </a:solidFill>
-                </a:rPr>
-                <a:t>End loop</a:t>
-              </a:r>
-              <a:endParaRPr lang="en-US" sz="1999" b="1" dirty="0">
-                <a:solidFill>
-                  <a:srgbClr val="FFFFFF"/>
-                </a:solidFill>
-              </a:endParaRPr>
-            </a:p>
-          </p:txBody>
-        </p:sp>
-        <p:sp>
-          <p:nvSpPr>
-            <p:cNvPr id="18" name="Rectangle 19">
-              <a:extLst>
-                <a:ext uri="{FF2B5EF4-FFF2-40B4-BE49-F238E27FC236}">
-                  <a16:creationId xmlns:a16="http://schemas.microsoft.com/office/drawing/2014/main" id="{D2E604F1-154B-4CF2-80CA-54F0EB2874CE}"/>
-                </a:ext>
-              </a:extLst>
-            </p:cNvPr>
-            <p:cNvSpPr/>
-            <p:nvPr/>
-          </p:nvSpPr>
-          <p:spPr bwMode="auto">
-            <a:xfrm>
-              <a:off x="1579625" y="2659188"/>
-              <a:ext cx="2102332" cy="600666"/>
-            </a:xfrm>
-            <a:prstGeom prst="rect">
-              <a:avLst/>
-            </a:prstGeom>
-            <a:solidFill>
-              <a:schemeClr val="dk2">
-                <a:alpha val="80000"/>
-              </a:schemeClr>
-            </a:solidFill>
-            <a:ln w="19050">
-              <a:solidFill>
-                <a:schemeClr val="tx1">
-                  <a:lumMod val="75000"/>
-                  <a:alpha val="80000"/>
-                </a:schemeClr>
-              </a:solidFill>
-            </a:ln>
-            <a:effectLst/>
-          </p:spPr>
-          <p:style>
-            <a:lnRef idx="2">
-              <a:schemeClr val="accent1">
-                <a:shade val="50000"/>
-              </a:schemeClr>
-            </a:lnRef>
-            <a:fillRef idx="1001">
-              <a:schemeClr val="dk2"/>
-            </a:fillRef>
-            <a:effectRef idx="0">
-              <a:schemeClr val="accent1"/>
-            </a:effectRef>
-            <a:fontRef idx="minor">
-              <a:schemeClr val="lt1"/>
-            </a:fontRef>
-          </p:style>
-          <p:txBody>
-            <a:bodyPr rot="0" spcFirstLastPara="0" vertOverflow="overflow" horzOverflow="overflow" vert="horz" wrap="square" lIns="91416" tIns="45708" rIns="91416" bIns="45708" numCol="1" spcCol="0" rtlCol="0" fromWordArt="0" anchor="ctr" anchorCtr="0" forceAA="0" compatLnSpc="1">
-              <a:prstTxWarp prst="textNoShape">
-                <a:avLst/>
-              </a:prstTxWarp>
-              <a:noAutofit/>
-            </a:bodyPr>
-            <a:lstStyle/>
-            <a:p>
-              <a:pPr algn="ctr"/>
-              <a:endParaRPr lang="bg-BG" sz="2799" b="1" dirty="0">
-                <a:solidFill>
-                  <a:srgbClr val="FFFFFF"/>
-                </a:solidFill>
-                <a:effectLst>
-                  <a:outerShdw blurRad="38100" dist="38100" dir="2700000" algn="tl">
-                    <a:srgbClr val="000000">
-                      <a:alpha val="43137"/>
-                    </a:srgbClr>
-                  </a:outerShdw>
-                </a:effectLst>
-              </a:endParaRPr>
-            </a:p>
-          </p:txBody>
-        </p:sp>
-        <p:sp>
-          <p:nvSpPr>
-            <p:cNvPr id="19" name="TextBox 20">
-              <a:extLst>
-                <a:ext uri="{FF2B5EF4-FFF2-40B4-BE49-F238E27FC236}">
-                  <a16:creationId xmlns:a16="http://schemas.microsoft.com/office/drawing/2014/main" id="{DBBF4751-629A-4C32-8E8B-058F5C6EC611}"/>
-                </a:ext>
-              </a:extLst>
-            </p:cNvPr>
-            <p:cNvSpPr txBox="1"/>
-            <p:nvPr/>
-          </p:nvSpPr>
-          <p:spPr>
-            <a:xfrm>
-              <a:off x="1579625" y="2671644"/>
-              <a:ext cx="2102331" cy="575754"/>
-            </a:xfrm>
-            <a:prstGeom prst="rect">
-              <a:avLst/>
-            </a:prstGeom>
-            <a:noFill/>
-            <a:ln w="12700">
-              <a:noFill/>
-            </a:ln>
-          </p:spPr>
-          <p:txBody>
-            <a:bodyPr vert="horz" wrap="square" lIns="143963" tIns="107972" rIns="143963" bIns="107972" rtlCol="0">
-              <a:spAutoFit/>
-            </a:bodyPr>
-            <a:lstStyle/>
-            <a:p>
-              <a:pPr algn="ctr" eaLnBrk="0" hangingPunct="0">
-                <a:buClr>
-                  <a:schemeClr val="accent5">
-                    <a:lumMod val="40000"/>
-                    <a:lumOff val="60000"/>
-                  </a:schemeClr>
-                </a:buClr>
-                <a:buSzPct val="70000"/>
-              </a:pPr>
               <a:r>
                 <a:rPr lang="en-US" sz="1999" b="1" noProof="1">
                   <a:solidFill>
@@ -39770,632 +40543,114 @@
                   </a:solidFill>
                   <a:latin typeface="Consolas" pitchFamily="49" charset="0"/>
                 </a:rPr>
-                <a:t>i</a:t>
+                <a:t>i &lt;=</a:t>
               </a:r>
               <a:r>
-                <a:rPr lang="en-US" sz="1999" b="1" dirty="0">
+                <a:rPr lang="bg-BG" sz="1999" b="1" noProof="1">
                   <a:solidFill>
                     <a:schemeClr val="bg2"/>
                   </a:solidFill>
                   <a:latin typeface="Consolas" pitchFamily="49" charset="0"/>
                 </a:rPr>
-                <a:t> = </a:t>
+                <a:t> 12</a:t>
               </a:r>
-              <a:r>
-                <a:rPr lang="en-US" sz="1999" b="1" noProof="1">
-                  <a:solidFill>
-                    <a:schemeClr val="bg2"/>
-                  </a:solidFill>
-                  <a:latin typeface="Consolas" pitchFamily="49" charset="0"/>
-                </a:rPr>
-                <a:t>1</a:t>
-              </a:r>
-              <a:endParaRPr lang="bg-BG" sz="1999" b="1" noProof="1">
+              <a:endParaRPr lang="en-US" sz="2399" b="1" dirty="0">
                 <a:solidFill>
                   <a:schemeClr val="bg2"/>
                 </a:solidFill>
-                <a:latin typeface="Consolas" pitchFamily="49" charset="0"/>
               </a:endParaRPr>
             </a:p>
           </p:txBody>
         </p:sp>
-        <p:grpSp>
-          <p:nvGrpSpPr>
-            <p:cNvPr id="5" name="Групиране 19">
-              <a:extLst>
-                <a:ext uri="{FF2B5EF4-FFF2-40B4-BE49-F238E27FC236}">
-                  <a16:creationId xmlns:a16="http://schemas.microsoft.com/office/drawing/2014/main" id="{8AEC38A1-D6C5-4A74-9A8B-898BFC67440A}"/>
-                </a:ext>
-              </a:extLst>
-            </p:cNvPr>
-            <p:cNvGrpSpPr/>
-            <p:nvPr/>
-          </p:nvGrpSpPr>
-          <p:grpSpPr>
-            <a:xfrm>
-              <a:off x="1663788" y="3765742"/>
-              <a:ext cx="1978159" cy="1122841"/>
-              <a:chOff x="2010580" y="3962382"/>
-              <a:chExt cx="1806822" cy="1025587"/>
-            </a:xfrm>
-          </p:grpSpPr>
-          <p:sp>
-            <p:nvSpPr>
-              <p:cNvPr id="23" name="Flowchart: Decision 22">
-                <a:extLst>
-                  <a:ext uri="{FF2B5EF4-FFF2-40B4-BE49-F238E27FC236}">
-                    <a16:creationId xmlns:a16="http://schemas.microsoft.com/office/drawing/2014/main" id="{346C756F-FFAD-40AC-9353-E6B881B9E394}"/>
-                  </a:ext>
-                </a:extLst>
-              </p:cNvPr>
-              <p:cNvSpPr/>
-              <p:nvPr/>
-            </p:nvSpPr>
-            <p:spPr bwMode="auto">
-              <a:xfrm>
-                <a:off x="2010580" y="3962382"/>
-                <a:ext cx="1806822" cy="1025587"/>
-              </a:xfrm>
-              <a:prstGeom prst="flowChartDecision">
-                <a:avLst/>
-              </a:prstGeom>
-              <a:solidFill>
-                <a:schemeClr val="dk2">
-                  <a:alpha val="80000"/>
-                </a:schemeClr>
-              </a:solidFill>
-              <a:ln w="19050">
-                <a:solidFill>
-                  <a:schemeClr val="tx1">
-                    <a:lumMod val="75000"/>
-                    <a:alpha val="80000"/>
-                  </a:schemeClr>
-                </a:solidFill>
-              </a:ln>
-              <a:effectLst/>
-            </p:spPr>
-            <p:style>
-              <a:lnRef idx="2">
-                <a:schemeClr val="accent1">
-                  <a:shade val="50000"/>
-                </a:schemeClr>
-              </a:lnRef>
-              <a:fillRef idx="1001">
-                <a:schemeClr val="dk2"/>
-              </a:fillRef>
-              <a:effectRef idx="0">
-                <a:schemeClr val="accent1"/>
-              </a:effectRef>
-              <a:fontRef idx="minor">
-                <a:schemeClr val="lt1"/>
-              </a:fontRef>
-            </p:style>
-            <p:txBody>
-              <a:bodyPr rot="0" spcFirstLastPara="0" vertOverflow="overflow" horzOverflow="overflow" vert="horz" wrap="square" lIns="91416" tIns="45708" rIns="91416" bIns="45708" numCol="1" spcCol="0" rtlCol="0" fromWordArt="0" anchor="ctr" anchorCtr="0" forceAA="0" compatLnSpc="1">
-                <a:prstTxWarp prst="textNoShape">
-                  <a:avLst/>
-                </a:prstTxWarp>
-                <a:noAutofit/>
-              </a:bodyPr>
-              <a:lstStyle/>
-              <a:p>
-                <a:pPr algn="ctr"/>
-                <a:endParaRPr lang="en-US" sz="1799" dirty="0">
-                  <a:solidFill>
-                    <a:schemeClr val="bg2"/>
-                  </a:solidFill>
-                  <a:effectLst>
-                    <a:outerShdw blurRad="38100" dist="38100" dir="2700000" algn="tl">
-                      <a:srgbClr val="000000">
-                        <a:alpha val="43137"/>
-                      </a:srgbClr>
-                    </a:outerShdw>
-                  </a:effectLst>
-                </a:endParaRPr>
-              </a:p>
-            </p:txBody>
-          </p:sp>
-          <p:sp>
-            <p:nvSpPr>
-              <p:cNvPr id="24" name="Rectangle 23">
-                <a:extLst>
-                  <a:ext uri="{FF2B5EF4-FFF2-40B4-BE49-F238E27FC236}">
-                    <a16:creationId xmlns:a16="http://schemas.microsoft.com/office/drawing/2014/main" id="{25C1882C-3B72-4189-9327-D11081D6E9A1}"/>
-                  </a:ext>
-                </a:extLst>
-              </p:cNvPr>
-              <p:cNvSpPr/>
-              <p:nvPr/>
-            </p:nvSpPr>
-            <p:spPr>
-              <a:xfrm>
-                <a:off x="2055450" y="4244343"/>
-                <a:ext cx="1717081" cy="393788"/>
-              </a:xfrm>
-              <a:prstGeom prst="rect">
-                <a:avLst/>
-              </a:prstGeom>
-            </p:spPr>
-            <p:txBody>
-              <a:bodyPr wrap="square">
-                <a:spAutoFit/>
-              </a:bodyPr>
-              <a:lstStyle/>
-              <a:p>
-                <a:pPr algn="ctr"/>
-                <a:r>
-                  <a:rPr lang="en-US" sz="1999" b="1" noProof="1">
-                    <a:solidFill>
-                      <a:schemeClr val="bg2"/>
-                    </a:solidFill>
-                    <a:latin typeface="Consolas" pitchFamily="49" charset="0"/>
-                  </a:rPr>
-                  <a:t>i &lt;=</a:t>
-                </a:r>
-                <a:r>
-                  <a:rPr lang="bg-BG" sz="1999" b="1" noProof="1">
-                    <a:solidFill>
-                      <a:schemeClr val="bg2"/>
-                    </a:solidFill>
-                    <a:latin typeface="Consolas" pitchFamily="49" charset="0"/>
-                  </a:rPr>
-                  <a:t> 12</a:t>
-                </a:r>
-                <a:endParaRPr lang="en-US" sz="2399" b="1" dirty="0">
-                  <a:solidFill>
-                    <a:schemeClr val="bg2"/>
-                  </a:solidFill>
-                </a:endParaRPr>
-              </a:p>
-            </p:txBody>
-          </p:sp>
-        </p:grpSp>
-        <p:cxnSp>
-          <p:nvCxnSpPr>
-            <p:cNvPr id="21" name="Straight Arrow Connector 27">
-              <a:extLst>
-                <a:ext uri="{FF2B5EF4-FFF2-40B4-BE49-F238E27FC236}">
-                  <a16:creationId xmlns:a16="http://schemas.microsoft.com/office/drawing/2014/main" id="{9D55D745-31FB-48E9-84FE-56787BEC19A8}"/>
-                </a:ext>
-              </a:extLst>
-            </p:cNvPr>
-            <p:cNvCxnSpPr>
-              <a:cxnSpLocks/>
-            </p:cNvCxnSpPr>
-            <p:nvPr/>
-          </p:nvCxnSpPr>
-          <p:spPr>
-            <a:xfrm rot="5400000">
-              <a:off x="2444250" y="3518536"/>
-              <a:ext cx="417235" cy="3041"/>
-            </a:xfrm>
-            <a:prstGeom prst="straightConnector1">
-              <a:avLst/>
-            </a:prstGeom>
-            <a:ln w="57150">
-              <a:tailEnd type="triangle"/>
-            </a:ln>
-          </p:spPr>
-          <p:style>
-            <a:lnRef idx="1">
-              <a:schemeClr val="accent1"/>
-            </a:lnRef>
-            <a:fillRef idx="0">
-              <a:schemeClr val="accent1"/>
-            </a:fillRef>
-            <a:effectRef idx="0">
-              <a:schemeClr val="accent1"/>
-            </a:effectRef>
-            <a:fontRef idx="minor">
-              <a:schemeClr val="tx1"/>
-            </a:fontRef>
-          </p:style>
-        </p:cxnSp>
-        <p:cxnSp>
-          <p:nvCxnSpPr>
-            <p:cNvPr id="22" name="Straight Arrow Connector 27">
-              <a:extLst>
-                <a:ext uri="{FF2B5EF4-FFF2-40B4-BE49-F238E27FC236}">
-                  <a16:creationId xmlns:a16="http://schemas.microsoft.com/office/drawing/2014/main" id="{81F86AD4-125A-4CA5-9BCA-0891B7F60E9B}"/>
-                </a:ext>
-              </a:extLst>
-            </p:cNvPr>
-            <p:cNvCxnSpPr>
-              <a:cxnSpLocks/>
-            </p:cNvCxnSpPr>
-            <p:nvPr/>
-          </p:nvCxnSpPr>
-          <p:spPr>
-            <a:xfrm rot="5400000">
-              <a:off x="2444250" y="5126074"/>
-              <a:ext cx="417235" cy="3041"/>
-            </a:xfrm>
-            <a:prstGeom prst="straightConnector1">
-              <a:avLst/>
-            </a:prstGeom>
-            <a:ln w="57150">
-              <a:tailEnd type="triangle"/>
-            </a:ln>
-          </p:spPr>
-          <p:style>
-            <a:lnRef idx="1">
-              <a:schemeClr val="accent1"/>
-            </a:lnRef>
-            <a:fillRef idx="0">
-              <a:schemeClr val="accent1"/>
-            </a:fillRef>
-            <a:effectRef idx="0">
-              <a:schemeClr val="accent1"/>
-            </a:effectRef>
-            <a:fontRef idx="minor">
-              <a:schemeClr val="tx1"/>
-            </a:fontRef>
-          </p:style>
-        </p:cxnSp>
       </p:grpSp>
-      <p:sp>
-        <p:nvSpPr>
-          <p:cNvPr id="26" name="Slide Number">
+      <p:cxnSp>
+        <p:nvCxnSpPr>
+          <p:cNvPr id="21" name="Straight Arrow Connector 27">
             <a:extLst>
               <a:ext uri="{FF2B5EF4-FFF2-40B4-BE49-F238E27FC236}">
-                <a16:creationId xmlns:a16="http://schemas.microsoft.com/office/drawing/2014/main" id="{49D132EE-557C-4353-935F-67420A5D8DEE}"/>
+                <a16:creationId xmlns:a16="http://schemas.microsoft.com/office/drawing/2014/main" id="{9D55D745-31FB-48E9-84FE-56787BEC19A8}"/>
               </a:ext>
             </a:extLst>
           </p:cNvPr>
-          <p:cNvSpPr txBox="1">
-            <a:spLocks/>
-          </p:cNvSpPr>
+          <p:cNvCxnSpPr>
+            <a:cxnSpLocks/>
+          </p:cNvCxnSpPr>
           <p:nvPr/>
-        </p:nvSpPr>
+        </p:nvCxnSpPr>
         <p:spPr>
-          <a:xfrm>
-            <a:off x="11753030" y="6507000"/>
-            <a:ext cx="367414" cy="297000"/>
+          <a:xfrm rot="5400000">
+            <a:off x="9045893" y="2418675"/>
+            <a:ext cx="383298" cy="2345"/>
           </a:xfrm>
-          <a:prstGeom prst="rect">
+          <a:prstGeom prst="straightConnector1">
             <a:avLst/>
           </a:prstGeom>
+          <a:ln w="57150">
+            <a:tailEnd type="triangle"/>
+          </a:ln>
         </p:spPr>
-        <p:txBody>
-          <a:bodyPr vert="horz" lIns="91440" tIns="45720" rIns="91440" bIns="45720" rtlCol="0" anchor="b"/>
-          <a:lstStyle>
-            <a:defPPr>
-              <a:defRPr lang="en-US"/>
-            </a:defPPr>
-            <a:lvl1pPr marL="0" algn="r" defTabSz="914400" rtl="0" eaLnBrk="1" latinLnBrk="0" hangingPunct="1">
-              <a:defRPr sz="1000" kern="1200">
-                <a:solidFill>
-                  <a:schemeClr val="tx1"/>
-                </a:solidFill>
-                <a:latin typeface="+mn-lt"/>
-                <a:ea typeface="+mn-ea"/>
-                <a:cs typeface="+mn-cs"/>
-              </a:defRPr>
-            </a:lvl1pPr>
-            <a:lvl2pPr marL="457200" algn="l" defTabSz="914400" rtl="0" eaLnBrk="1" latinLnBrk="0" hangingPunct="1">
-              <a:defRPr sz="1800" kern="1200">
-                <a:solidFill>
-                  <a:schemeClr val="tx1"/>
-                </a:solidFill>
-                <a:latin typeface="+mn-lt"/>
-                <a:ea typeface="+mn-ea"/>
-                <a:cs typeface="+mn-cs"/>
-              </a:defRPr>
-            </a:lvl2pPr>
-            <a:lvl3pPr marL="914400" algn="l" defTabSz="914400" rtl="0" eaLnBrk="1" latinLnBrk="0" hangingPunct="1">
-              <a:defRPr sz="1800" kern="1200">
-                <a:solidFill>
-                  <a:schemeClr val="tx1"/>
-                </a:solidFill>
-                <a:latin typeface="+mn-lt"/>
-                <a:ea typeface="+mn-ea"/>
-                <a:cs typeface="+mn-cs"/>
-              </a:defRPr>
-            </a:lvl3pPr>
-            <a:lvl4pPr marL="1371600" algn="l" defTabSz="914400" rtl="0" eaLnBrk="1" latinLnBrk="0" hangingPunct="1">
-              <a:defRPr sz="1800" kern="1200">
-                <a:solidFill>
-                  <a:schemeClr val="tx1"/>
-                </a:solidFill>
-                <a:latin typeface="+mn-lt"/>
-                <a:ea typeface="+mn-ea"/>
-                <a:cs typeface="+mn-cs"/>
-              </a:defRPr>
-            </a:lvl4pPr>
-            <a:lvl5pPr marL="1828800" algn="l" defTabSz="914400" rtl="0" eaLnBrk="1" latinLnBrk="0" hangingPunct="1">
-              <a:defRPr sz="1800" kern="1200">
-                <a:solidFill>
-                  <a:schemeClr val="tx1"/>
-                </a:solidFill>
-                <a:latin typeface="+mn-lt"/>
-                <a:ea typeface="+mn-ea"/>
-                <a:cs typeface="+mn-cs"/>
-              </a:defRPr>
-            </a:lvl5pPr>
-            <a:lvl6pPr marL="2286000" algn="l" defTabSz="914400" rtl="0" eaLnBrk="1" latinLnBrk="0" hangingPunct="1">
-              <a:defRPr sz="1800" kern="1200">
-                <a:solidFill>
-                  <a:schemeClr val="tx1"/>
-                </a:solidFill>
-                <a:latin typeface="+mn-lt"/>
-                <a:ea typeface="+mn-ea"/>
-                <a:cs typeface="+mn-cs"/>
-              </a:defRPr>
-            </a:lvl6pPr>
-            <a:lvl7pPr marL="2743200" algn="l" defTabSz="914400" rtl="0" eaLnBrk="1" latinLnBrk="0" hangingPunct="1">
-              <a:defRPr sz="1800" kern="1200">
-                <a:solidFill>
-                  <a:schemeClr val="tx1"/>
-                </a:solidFill>
-                <a:latin typeface="+mn-lt"/>
-                <a:ea typeface="+mn-ea"/>
-                <a:cs typeface="+mn-cs"/>
-              </a:defRPr>
-            </a:lvl7pPr>
-            <a:lvl8pPr marL="3200400" algn="l" defTabSz="914400" rtl="0" eaLnBrk="1" latinLnBrk="0" hangingPunct="1">
-              <a:defRPr sz="1800" kern="1200">
-                <a:solidFill>
-                  <a:schemeClr val="tx1"/>
-                </a:solidFill>
-                <a:latin typeface="+mn-lt"/>
-                <a:ea typeface="+mn-ea"/>
-                <a:cs typeface="+mn-cs"/>
-              </a:defRPr>
-            </a:lvl8pPr>
-            <a:lvl9pPr marL="3657600" algn="l" defTabSz="914400" rtl="0" eaLnBrk="1" latinLnBrk="0" hangingPunct="1">
-              <a:defRPr sz="1800" kern="1200">
-                <a:solidFill>
-                  <a:schemeClr val="tx1"/>
-                </a:solidFill>
-                <a:latin typeface="+mn-lt"/>
-                <a:ea typeface="+mn-ea"/>
-                <a:cs typeface="+mn-cs"/>
-              </a:defRPr>
-            </a:lvl9pPr>
-          </a:lstStyle>
-          <a:p>
-            <a:fld id="{2BF067CD-8E6B-4360-9AA8-C5DF2A48A6D1}" type="slidenum">
-              <a:rPr lang="en-US" smtClean="0"/>
-              <a:pPr/>
-              <a:t>5</a:t>
-            </a:fld>
-            <a:endParaRPr lang="en-US" dirty="0"/>
-          </a:p>
-        </p:txBody>
-      </p:sp>
-      <p:sp>
-        <p:nvSpPr>
-          <p:cNvPr id="25" name="Text Placeholder 1">
+        <p:style>
+          <a:lnRef idx="1">
+            <a:schemeClr val="accent1"/>
+          </a:lnRef>
+          <a:fillRef idx="0">
+            <a:schemeClr val="accent1"/>
+          </a:fillRef>
+          <a:effectRef idx="0">
+            <a:schemeClr val="accent1"/>
+          </a:effectRef>
+          <a:fontRef idx="minor">
+            <a:schemeClr val="tx1"/>
+          </a:fontRef>
+        </p:style>
+      </p:cxnSp>
+      <p:cxnSp>
+        <p:nvCxnSpPr>
+          <p:cNvPr id="22" name="Straight Arrow Connector 27">
             <a:extLst>
               <a:ext uri="{FF2B5EF4-FFF2-40B4-BE49-F238E27FC236}">
-                <a16:creationId xmlns:a16="http://schemas.microsoft.com/office/drawing/2014/main" id="{9110992C-5185-43F2-89F9-090B4CD629EA}"/>
+                <a16:creationId xmlns:a16="http://schemas.microsoft.com/office/drawing/2014/main" id="{81F86AD4-125A-4CA5-9BCA-0891B7F60E9B}"/>
               </a:ext>
             </a:extLst>
           </p:cNvPr>
-          <p:cNvSpPr txBox="1">
-            <a:spLocks/>
-          </p:cNvSpPr>
+          <p:cNvCxnSpPr>
+            <a:cxnSpLocks/>
+          </p:cNvCxnSpPr>
           <p:nvPr/>
-        </p:nvSpPr>
+        </p:nvCxnSpPr>
         <p:spPr>
-          <a:xfrm>
-            <a:off x="190451" y="1196708"/>
-            <a:ext cx="6232836" cy="3132058"/>
+          <a:xfrm rot="5400000">
+            <a:off x="9045893" y="3895458"/>
+            <a:ext cx="383298" cy="2345"/>
           </a:xfrm>
-          <a:prstGeom prst="rect">
+          <a:prstGeom prst="straightConnector1">
             <a:avLst/>
           </a:prstGeom>
+          <a:ln w="57150">
+            <a:tailEnd type="triangle"/>
+          </a:ln>
         </p:spPr>
-        <p:txBody>
-          <a:bodyPr vert="horz" lIns="107972" tIns="35991" rIns="107972" bIns="35991" rtlCol="0">
-            <a:noAutofit/>
-          </a:bodyPr>
-          <a:lstStyle>
-            <a:lvl1pPr marL="360363" indent="-360363" algn="l" defTabSz="1218438" rtl="0" eaLnBrk="1" latinLnBrk="0" hangingPunct="1">
-              <a:lnSpc>
-                <a:spcPct val="105000"/>
-              </a:lnSpc>
-              <a:spcBef>
-                <a:spcPts val="600"/>
-              </a:spcBef>
-              <a:spcAft>
-                <a:spcPts val="600"/>
-              </a:spcAft>
-              <a:buFont typeface="Wingdings" panose="05000000000000000000" pitchFamily="2" charset="2"/>
-              <a:buChar char="§"/>
-              <a:defRPr sz="3398" kern="1200">
-                <a:solidFill>
-                  <a:schemeClr val="tx1"/>
-                </a:solidFill>
-                <a:latin typeface="+mn-lt"/>
-                <a:ea typeface="+mn-ea"/>
-                <a:cs typeface="+mn-cs"/>
-              </a:defRPr>
-            </a:lvl1pPr>
-            <a:lvl2pPr marL="803275" indent="-360363" algn="l" defTabSz="1218438" rtl="0" eaLnBrk="1" latinLnBrk="0" hangingPunct="1">
-              <a:lnSpc>
-                <a:spcPct val="105000"/>
-              </a:lnSpc>
-              <a:spcBef>
-                <a:spcPts val="600"/>
-              </a:spcBef>
-              <a:spcAft>
-                <a:spcPts val="600"/>
-              </a:spcAft>
-              <a:buFont typeface="Wingdings" panose="05000000000000000000" pitchFamily="2" charset="2"/>
-              <a:buChar char="§"/>
-              <a:defRPr sz="3198" kern="1200">
-                <a:solidFill>
-                  <a:schemeClr val="tx1"/>
-                </a:solidFill>
-                <a:latin typeface="+mn-lt"/>
-                <a:ea typeface="+mn-ea"/>
-                <a:cs typeface="+mn-cs"/>
-              </a:defRPr>
-            </a:lvl2pPr>
-            <a:lvl3pPr marL="1255713" indent="-360363" algn="l" defTabSz="1218438" rtl="0" eaLnBrk="1" latinLnBrk="0" hangingPunct="1">
-              <a:lnSpc>
-                <a:spcPct val="105000"/>
-              </a:lnSpc>
-              <a:spcBef>
-                <a:spcPts val="600"/>
-              </a:spcBef>
-              <a:spcAft>
-                <a:spcPts val="600"/>
-              </a:spcAft>
-              <a:buFont typeface="Wingdings" panose="05000000000000000000" pitchFamily="2" charset="2"/>
-              <a:buChar char="§"/>
-              <a:defRPr sz="2998" kern="1200">
-                <a:solidFill>
-                  <a:schemeClr val="tx1"/>
-                </a:solidFill>
-                <a:latin typeface="+mn-lt"/>
-                <a:ea typeface="+mn-ea"/>
-                <a:cs typeface="+mn-cs"/>
-              </a:defRPr>
-            </a:lvl3pPr>
-            <a:lvl4pPr marL="1700213" indent="-352425" algn="l" defTabSz="1218438" rtl="0" eaLnBrk="1" latinLnBrk="0" hangingPunct="1">
-              <a:lnSpc>
-                <a:spcPct val="105000"/>
-              </a:lnSpc>
-              <a:spcBef>
-                <a:spcPts val="600"/>
-              </a:spcBef>
-              <a:spcAft>
-                <a:spcPts val="600"/>
-              </a:spcAft>
-              <a:buFont typeface="Wingdings" panose="05000000000000000000" pitchFamily="2" charset="2"/>
-              <a:buChar char="§"/>
-              <a:defRPr sz="2798" kern="1200">
-                <a:solidFill>
-                  <a:schemeClr val="tx1"/>
-                </a:solidFill>
-                <a:latin typeface="+mn-lt"/>
-                <a:ea typeface="+mn-ea"/>
-                <a:cs typeface="+mn-cs"/>
-              </a:defRPr>
-            </a:lvl4pPr>
-            <a:lvl5pPr marL="2058988" indent="-266700" algn="l" defTabSz="1218438" rtl="0" eaLnBrk="1" latinLnBrk="0" hangingPunct="1">
-              <a:lnSpc>
-                <a:spcPct val="105000"/>
-              </a:lnSpc>
-              <a:spcBef>
-                <a:spcPts val="600"/>
-              </a:spcBef>
-              <a:spcAft>
-                <a:spcPts val="600"/>
-              </a:spcAft>
-              <a:buFont typeface="Wingdings" panose="05000000000000000000" pitchFamily="2" charset="2"/>
-              <a:buChar char="§"/>
-              <a:defRPr sz="2598" kern="1200">
-                <a:solidFill>
-                  <a:schemeClr val="tx1"/>
-                </a:solidFill>
-                <a:latin typeface="+mn-lt"/>
-                <a:ea typeface="+mn-ea"/>
-                <a:cs typeface="+mn-cs"/>
-              </a:defRPr>
-            </a:lvl5pPr>
-            <a:lvl6pPr marL="3350704" indent="-304610" algn="l" defTabSz="1218438" rtl="0" eaLnBrk="1" latinLnBrk="1" hangingPunct="1">
-              <a:spcBef>
-                <a:spcPct val="20000"/>
-              </a:spcBef>
-              <a:buFont typeface="Arial" pitchFamily="34" charset="0"/>
-              <a:buChar char="•"/>
-              <a:defRPr sz="2665" kern="1200">
-                <a:solidFill>
-                  <a:schemeClr val="tx1"/>
-                </a:solidFill>
-                <a:latin typeface="+mn-lt"/>
-                <a:ea typeface="+mn-ea"/>
-                <a:cs typeface="+mn-cs"/>
-              </a:defRPr>
-            </a:lvl6pPr>
-            <a:lvl7pPr marL="3959924" indent="-304610" algn="l" defTabSz="1218438" rtl="0" eaLnBrk="1" latinLnBrk="1" hangingPunct="1">
-              <a:spcBef>
-                <a:spcPct val="20000"/>
-              </a:spcBef>
-              <a:buFont typeface="Arial" pitchFamily="34" charset="0"/>
-              <a:buChar char="•"/>
-              <a:defRPr sz="2665" kern="1200">
-                <a:solidFill>
-                  <a:schemeClr val="tx1"/>
-                </a:solidFill>
-                <a:latin typeface="+mn-lt"/>
-                <a:ea typeface="+mn-ea"/>
-                <a:cs typeface="+mn-cs"/>
-              </a:defRPr>
-            </a:lvl7pPr>
-            <a:lvl8pPr marL="4569143" indent="-304610" algn="l" defTabSz="1218438" rtl="0" eaLnBrk="1" latinLnBrk="1" hangingPunct="1">
-              <a:spcBef>
-                <a:spcPct val="20000"/>
-              </a:spcBef>
-              <a:buFont typeface="Arial" pitchFamily="34" charset="0"/>
-              <a:buChar char="•"/>
-              <a:defRPr sz="2665" kern="1200">
-                <a:solidFill>
-                  <a:schemeClr val="tx1"/>
-                </a:solidFill>
-                <a:latin typeface="+mn-lt"/>
-                <a:ea typeface="+mn-ea"/>
-                <a:cs typeface="+mn-cs"/>
-              </a:defRPr>
-            </a:lvl8pPr>
-            <a:lvl9pPr marL="5178362" indent="-304610" algn="l" defTabSz="1218438" rtl="0" eaLnBrk="1" latinLnBrk="1" hangingPunct="1">
-              <a:spcBef>
-                <a:spcPct val="20000"/>
-              </a:spcBef>
-              <a:buFont typeface="Arial" pitchFamily="34" charset="0"/>
-              <a:buChar char="•"/>
-              <a:defRPr sz="2665" kern="1200">
-                <a:solidFill>
-                  <a:schemeClr val="tx1"/>
-                </a:solidFill>
-                <a:latin typeface="+mn-lt"/>
-                <a:ea typeface="+mn-ea"/>
-                <a:cs typeface="+mn-cs"/>
-              </a:defRPr>
-            </a:lvl9pPr>
-          </a:lstStyle>
-          <a:p>
-            <a:pPr marL="456778" indent="-456778" eaLnBrk="0" hangingPunct="0"/>
-            <a:r>
-              <a:rPr lang="bg-BG" sz="3599" dirty="0"/>
-              <a:t>Циклите в програмирането ни позволяват да </a:t>
-            </a:r>
-            <a:r>
-              <a:rPr lang="bg-BG" sz="3599" b="1" dirty="0">
-                <a:solidFill>
-                  <a:schemeClr val="bg1"/>
-                </a:solidFill>
-              </a:rPr>
-              <a:t>повтаряме</a:t>
-            </a:r>
-            <a:r>
-              <a:rPr lang="bg-BG" sz="3599" dirty="0"/>
-              <a:t> </a:t>
-            </a:r>
-            <a:r>
-              <a:rPr lang="bg-BG" sz="3599" b="1" dirty="0">
-                <a:solidFill>
-                  <a:schemeClr val="bg1"/>
-                </a:solidFill>
-              </a:rPr>
-              <a:t>едни и същи действия </a:t>
-            </a:r>
-            <a:r>
-              <a:rPr lang="bg-BG" sz="3599" dirty="0"/>
-              <a:t>определен брой пъти:</a:t>
-            </a:r>
-          </a:p>
-        </p:txBody>
-      </p:sp>
+        <p:style>
+          <a:lnRef idx="1">
+            <a:schemeClr val="accent1"/>
+          </a:lnRef>
+          <a:fillRef idx="0">
+            <a:schemeClr val="accent1"/>
+          </a:fillRef>
+          <a:effectRef idx="0">
+            <a:schemeClr val="accent1"/>
+          </a:effectRef>
+          <a:fontRef idx="minor">
+            <a:schemeClr val="tx1"/>
+          </a:fontRef>
+        </p:style>
+      </p:cxnSp>
       <p:sp>
         <p:nvSpPr>
-          <p:cNvPr id="7" name="Rectangle: Rounded Corners 6">
+          <p:cNvPr id="20" name="Rectangle 32">
             <a:extLst>
               <a:ext uri="{FF2B5EF4-FFF2-40B4-BE49-F238E27FC236}">
-                <a16:creationId xmlns:a16="http://schemas.microsoft.com/office/drawing/2014/main" id="{11BB5436-C152-C2F4-B2AE-17EFE34D4ADA}"/>
+                <a16:creationId xmlns:a16="http://schemas.microsoft.com/office/drawing/2014/main" id="{C92AADD0-5923-B3C6-BB9E-3AF344141D56}"/>
               </a:ext>
             </a:extLst>
           </p:cNvPr>
@@ -40404,16 +40659,16 @@
         </p:nvSpPr>
         <p:spPr bwMode="auto">
           <a:xfrm>
-            <a:off x="7905487" y="4855738"/>
-            <a:ext cx="3864444" cy="1739171"/>
+            <a:off x="8414618" y="5216677"/>
+            <a:ext cx="1616361" cy="551809"/>
           </a:xfrm>
-          <a:prstGeom prst="roundRect">
+          <a:prstGeom prst="rect">
             <a:avLst/>
           </a:prstGeom>
           <a:solidFill>
-            <a:srgbClr val="FFFF00">
+            <a:schemeClr val="dk2">
               <a:alpha val="80000"/>
-            </a:srgbClr>
+            </a:schemeClr>
           </a:solidFill>
           <a:ln w="19050">
             <a:solidFill>
@@ -40442,7 +40697,7 @@
           </a:fontRef>
         </p:style>
         <p:txBody>
-          <a:bodyPr rot="0" spcFirstLastPara="0" vertOverflow="overflow" horzOverflow="overflow" vert="horz" wrap="square" lIns="91440" tIns="45720" rIns="91440" bIns="45720" numCol="1" spcCol="0" rtlCol="0" fromWordArt="0" anchor="ctr" anchorCtr="0" forceAA="0" compatLnSpc="1">
+          <a:bodyPr rot="0" spcFirstLastPara="0" vertOverflow="overflow" horzOverflow="overflow" vert="horz" wrap="square" lIns="91416" tIns="45708" rIns="91416" bIns="45708" numCol="1" spcCol="0" rtlCol="0" fromWordArt="0" anchor="ctr" anchorCtr="0" forceAA="0" compatLnSpc="1">
             <a:prstTxWarp prst="textNoShape">
               <a:avLst/>
             </a:prstTxWarp>
@@ -40451,159 +40706,330 @@
           <a:lstStyle/>
           <a:p>
             <a:pPr algn="ctr"/>
-            <a:r>
-              <a:rPr lang="en-US" sz="2800" dirty="0">
-                <a:ln w="0"/>
-                <a:solidFill>
-                  <a:schemeClr val="tx1"/>
-                </a:solidFill>
-                <a:effectLst>
-                  <a:outerShdw blurRad="38100" dist="19050" dir="2700000" algn="tl" rotWithShape="0">
-                    <a:schemeClr val="dk1">
-                      <a:alpha val="40000"/>
-                    </a:schemeClr>
-                  </a:outerShdw>
-                </a:effectLst>
-              </a:rPr>
-              <a:t>TODO:</a:t>
-            </a:r>
-          </a:p>
-          <a:p>
-            <a:pPr algn="ctr"/>
-            <a:r>
-              <a:rPr lang="bg-BG" sz="2800" dirty="0">
-                <a:ln w="0"/>
-                <a:solidFill>
-                  <a:schemeClr val="tx1"/>
-                </a:solidFill>
-                <a:effectLst>
-                  <a:outerShdw blurRad="38100" dist="19050" dir="2700000" algn="tl" rotWithShape="0">
-                    <a:schemeClr val="dk1">
-                      <a:alpha val="40000"/>
-                    </a:schemeClr>
-                  </a:outerShdw>
-                </a:effectLst>
-              </a:rPr>
-              <a:t>2 отделни стъпки:</a:t>
-            </a:r>
-          </a:p>
-          <a:p>
-            <a:pPr algn="ctr"/>
-            <a:r>
-              <a:rPr lang="en-US" sz="2800" dirty="0">
-                <a:ln w="0"/>
-                <a:solidFill>
-                  <a:schemeClr val="tx1"/>
-                </a:solidFill>
-                <a:effectLst>
-                  <a:outerShdw blurRad="38100" dist="19050" dir="2700000" algn="tl" rotWithShape="0">
-                    <a:schemeClr val="dk1">
-                      <a:alpha val="40000"/>
-                    </a:schemeClr>
-                  </a:outerShdw>
-                </a:effectLst>
-              </a:rPr>
-              <a:t>Print </a:t>
-            </a:r>
-            <a:r>
-              <a:rPr lang="en-US" sz="2800" dirty="0" err="1">
-                <a:ln w="0"/>
-                <a:solidFill>
-                  <a:schemeClr val="tx1"/>
-                </a:solidFill>
-                <a:effectLst>
-                  <a:outerShdw blurRad="38100" dist="19050" dir="2700000" algn="tl" rotWithShape="0">
-                    <a:schemeClr val="dk1">
-                      <a:alpha val="40000"/>
-                    </a:schemeClr>
-                  </a:outerShdw>
-                </a:effectLst>
-              </a:rPr>
-              <a:t>i</a:t>
-            </a:r>
-            <a:endParaRPr lang="en-US" sz="2800" dirty="0">
-              <a:ln w="0"/>
+            <a:endParaRPr lang="bg-BG" sz="2799" b="1" dirty="0">
               <a:solidFill>
-                <a:schemeClr val="tx1"/>
+                <a:srgbClr val="FFFFFF"/>
               </a:solidFill>
               <a:effectLst>
-                <a:outerShdw blurRad="38100" dist="19050" dir="2700000" algn="tl" rotWithShape="0">
-                  <a:schemeClr val="dk1">
-                    <a:alpha val="40000"/>
-                  </a:schemeClr>
+                <a:outerShdw blurRad="38100" dist="38100" dir="2700000" algn="tl">
+                  <a:srgbClr val="000000">
+                    <a:alpha val="43137"/>
+                  </a:srgbClr>
                 </a:outerShdw>
               </a:effectLst>
             </a:endParaRPr>
           </a:p>
-          <a:p>
-            <a:pPr algn="ctr"/>
-            <a:r>
-              <a:rPr lang="en-US" sz="2800" dirty="0" err="1">
-                <a:ln w="0"/>
-                <a:solidFill>
-                  <a:schemeClr val="tx1"/>
+        </p:txBody>
+      </p:sp>
+      <p:sp>
+        <p:nvSpPr>
+          <p:cNvPr id="27" name="TextBox 33">
+            <a:extLst>
+              <a:ext uri="{FF2B5EF4-FFF2-40B4-BE49-F238E27FC236}">
+                <a16:creationId xmlns:a16="http://schemas.microsoft.com/office/drawing/2014/main" id="{E36DE485-7341-BF08-490E-A38AE0B6BD36}"/>
+              </a:ext>
+            </a:extLst>
+          </p:cNvPr>
+          <p:cNvSpPr txBox="1"/>
+          <p:nvPr/>
+        </p:nvSpPr>
+        <p:spPr>
+          <a:xfrm>
+            <a:off x="8414618" y="5216676"/>
+            <a:ext cx="1616361" cy="581685"/>
+          </a:xfrm>
+          <a:prstGeom prst="rect">
+            <a:avLst/>
+          </a:prstGeom>
+          <a:noFill/>
+          <a:ln w="12700">
+            <a:noFill/>
+          </a:ln>
+        </p:spPr>
+        <p:txBody>
+          <a:bodyPr vert="horz" wrap="square" lIns="143963" tIns="107972" rIns="143963" bIns="107972" rtlCol="0">
+            <a:spAutoFit/>
+          </a:bodyPr>
+          <a:lstStyle/>
+          <a:p>
+            <a:pPr algn="ctr" eaLnBrk="0" hangingPunct="0">
+              <a:buClr>
+                <a:schemeClr val="accent5">
+                  <a:lumMod val="40000"/>
+                  <a:lumOff val="60000"/>
+                </a:schemeClr>
+              </a:buClr>
+              <a:buSzPct val="70000"/>
+            </a:pPr>
+            <a:r>
+              <a:rPr lang="en-US" sz="2399" b="1" noProof="1">
+                <a:solidFill>
+                  <a:schemeClr val="bg2"/>
+                </a:solidFill>
+                <a:latin typeface="Consolas" pitchFamily="49" charset="0"/>
+              </a:rPr>
+              <a:t>i += </a:t>
+            </a:r>
+            <a:r>
+              <a:rPr lang="bg-BG" sz="2399" b="1" dirty="0">
+                <a:solidFill>
+                  <a:schemeClr val="bg2"/>
+                </a:solidFill>
+                <a:latin typeface="Consolas" pitchFamily="49" charset="0"/>
+              </a:rPr>
+              <a:t>1</a:t>
+            </a:r>
+            <a:endParaRPr lang="en-US" sz="2399" b="1" dirty="0">
+              <a:solidFill>
+                <a:schemeClr val="bg2"/>
+              </a:solidFill>
+              <a:latin typeface="Consolas" pitchFamily="49" charset="0"/>
+            </a:endParaRPr>
+          </a:p>
+        </p:txBody>
+      </p:sp>
+      <p:cxnSp>
+        <p:nvCxnSpPr>
+          <p:cNvPr id="30" name="Straight Arrow Connector 27">
+            <a:extLst>
+              <a:ext uri="{FF2B5EF4-FFF2-40B4-BE49-F238E27FC236}">
+                <a16:creationId xmlns:a16="http://schemas.microsoft.com/office/drawing/2014/main" id="{B223037B-E011-1E67-638A-057C9BEEA337}"/>
+              </a:ext>
+            </a:extLst>
+          </p:cNvPr>
+          <p:cNvCxnSpPr>
+            <a:cxnSpLocks/>
+          </p:cNvCxnSpPr>
+          <p:nvPr/>
+        </p:nvCxnSpPr>
+        <p:spPr>
+          <a:xfrm rot="5400000">
+            <a:off x="9027698" y="4977139"/>
+            <a:ext cx="383298" cy="2345"/>
+          </a:xfrm>
+          <a:prstGeom prst="straightConnector1">
+            <a:avLst/>
+          </a:prstGeom>
+          <a:ln w="57150">
+            <a:tailEnd type="triangle"/>
+          </a:ln>
+        </p:spPr>
+        <p:style>
+          <a:lnRef idx="1">
+            <a:schemeClr val="accent1"/>
+          </a:lnRef>
+          <a:fillRef idx="0">
+            <a:schemeClr val="accent1"/>
+          </a:fillRef>
+          <a:effectRef idx="0">
+            <a:schemeClr val="accent1"/>
+          </a:effectRef>
+          <a:fontRef idx="minor">
+            <a:schemeClr val="tx1"/>
+          </a:fontRef>
+        </p:style>
+      </p:cxnSp>
+      <p:grpSp>
+        <p:nvGrpSpPr>
+          <p:cNvPr id="70" name="Group 69">
+            <a:extLst>
+              <a:ext uri="{FF2B5EF4-FFF2-40B4-BE49-F238E27FC236}">
+                <a16:creationId xmlns:a16="http://schemas.microsoft.com/office/drawing/2014/main" id="{98BCBBFD-8942-4CA2-5D29-A0DBC50DC820}"/>
+              </a:ext>
+            </a:extLst>
+          </p:cNvPr>
+          <p:cNvGrpSpPr/>
+          <p:nvPr/>
+        </p:nvGrpSpPr>
+        <p:grpSpPr>
+          <a:xfrm>
+            <a:off x="7808378" y="3168342"/>
+            <a:ext cx="601683" cy="2539023"/>
+            <a:chOff x="7696464" y="1757842"/>
+            <a:chExt cx="601683" cy="3833196"/>
+          </a:xfrm>
+          <a:solidFill>
+            <a:schemeClr val="accent1"/>
+          </a:solidFill>
+        </p:grpSpPr>
+        <p:sp>
+          <p:nvSpPr>
+            <p:cNvPr id="61" name="Rectangle 60">
+              <a:extLst>
+                <a:ext uri="{FF2B5EF4-FFF2-40B4-BE49-F238E27FC236}">
+                  <a16:creationId xmlns:a16="http://schemas.microsoft.com/office/drawing/2014/main" id="{E5625489-DF1D-795C-E79D-FD9076150075}"/>
+                </a:ext>
+              </a:extLst>
+            </p:cNvPr>
+            <p:cNvSpPr/>
+            <p:nvPr/>
+          </p:nvSpPr>
+          <p:spPr bwMode="auto">
+            <a:xfrm>
+              <a:off x="7696464" y="1757842"/>
+              <a:ext cx="45719" cy="3751674"/>
+            </a:xfrm>
+            <a:prstGeom prst="rect">
+              <a:avLst/>
+            </a:prstGeom>
+            <a:grpFill/>
+            <a:ln w="19050">
+              <a:noFill/>
+            </a:ln>
+            <a:effectLst/>
+          </p:spPr>
+          <p:style>
+            <a:lnRef idx="2">
+              <a:schemeClr val="accent1">
+                <a:shade val="50000"/>
+              </a:schemeClr>
+            </a:lnRef>
+            <a:fillRef idx="1001">
+              <a:schemeClr val="dk2"/>
+            </a:fillRef>
+            <a:effectRef idx="0">
+              <a:schemeClr val="accent1"/>
+            </a:effectRef>
+            <a:fontRef idx="minor">
+              <a:schemeClr val="lt1"/>
+            </a:fontRef>
+          </p:style>
+          <p:txBody>
+            <a:bodyPr rot="0" spcFirstLastPara="0" vertOverflow="overflow" horzOverflow="overflow" vert="horz" wrap="square" lIns="91440" tIns="45720" rIns="91440" bIns="45720" numCol="1" spcCol="0" rtlCol="0" fromWordArt="0" anchor="ctr" anchorCtr="0" forceAA="0" compatLnSpc="1">
+              <a:prstTxWarp prst="textNoShape">
+                <a:avLst/>
+              </a:prstTxWarp>
+              <a:noAutofit/>
+            </a:bodyPr>
+            <a:lstStyle/>
+            <a:p>
+              <a:pPr algn="ctr"/>
+              <a:endParaRPr lang="en-BG" sz="2800" b="1" dirty="0">
+                <a:solidFill>
+                  <a:srgbClr val="FFFFFF"/>
                 </a:solidFill>
                 <a:effectLst>
-                  <a:outerShdw blurRad="38100" dist="19050" dir="2700000" algn="tl" rotWithShape="0">
-                    <a:schemeClr val="dk1">
-                      <a:alpha val="40000"/>
-                    </a:schemeClr>
+                  <a:outerShdw blurRad="38100" dist="38100" dir="2700000" algn="tl">
+                    <a:srgbClr val="000000">
+                      <a:alpha val="43137"/>
+                    </a:srgbClr>
                   </a:outerShdw>
                 </a:effectLst>
-              </a:rPr>
-              <a:t>i</a:t>
-            </a:r>
-            <a:r>
-              <a:rPr lang="en-US" sz="2800" dirty="0">
-                <a:ln w="0"/>
-                <a:solidFill>
-                  <a:schemeClr val="tx1"/>
+              </a:endParaRPr>
+            </a:p>
+          </p:txBody>
+        </p:sp>
+        <p:cxnSp>
+          <p:nvCxnSpPr>
+            <p:cNvPr id="65" name="Straight Arrow Connector 64">
+              <a:extLst>
+                <a:ext uri="{FF2B5EF4-FFF2-40B4-BE49-F238E27FC236}">
+                  <a16:creationId xmlns:a16="http://schemas.microsoft.com/office/drawing/2014/main" id="{853EA118-2CB5-E244-171E-588E1E358EBF}"/>
+                </a:ext>
+              </a:extLst>
+            </p:cNvPr>
+            <p:cNvCxnSpPr>
+              <a:cxnSpLocks/>
+              <a:stCxn id="61" idx="0"/>
+            </p:cNvCxnSpPr>
+            <p:nvPr/>
+          </p:nvCxnSpPr>
+          <p:spPr>
+            <a:xfrm>
+              <a:off x="7719324" y="1757842"/>
+              <a:ext cx="578823" cy="0"/>
+            </a:xfrm>
+            <a:prstGeom prst="straightConnector1">
+              <a:avLst/>
+            </a:prstGeom>
+            <a:grpFill/>
+            <a:ln w="50800">
+              <a:tailEnd type="triangle"/>
+            </a:ln>
+          </p:spPr>
+          <p:style>
+            <a:lnRef idx="1">
+              <a:schemeClr val="accent1"/>
+            </a:lnRef>
+            <a:fillRef idx="0">
+              <a:schemeClr val="accent1"/>
+            </a:fillRef>
+            <a:effectRef idx="0">
+              <a:schemeClr val="accent1"/>
+            </a:effectRef>
+            <a:fontRef idx="minor">
+              <a:schemeClr val="tx1"/>
+            </a:fontRef>
+          </p:style>
+        </p:cxnSp>
+        <p:sp>
+          <p:nvSpPr>
+            <p:cNvPr id="69" name="Rectangle 68">
+              <a:extLst>
+                <a:ext uri="{FF2B5EF4-FFF2-40B4-BE49-F238E27FC236}">
+                  <a16:creationId xmlns:a16="http://schemas.microsoft.com/office/drawing/2014/main" id="{2BED4D7D-21E6-464F-138C-BE179ED8EE5E}"/>
+                </a:ext>
+              </a:extLst>
+            </p:cNvPr>
+            <p:cNvSpPr/>
+            <p:nvPr/>
+          </p:nvSpPr>
+          <p:spPr bwMode="auto">
+            <a:xfrm>
+              <a:off x="7696464" y="5522015"/>
+              <a:ext cx="418860" cy="69023"/>
+            </a:xfrm>
+            <a:prstGeom prst="rect">
+              <a:avLst/>
+            </a:prstGeom>
+            <a:grpFill/>
+            <a:ln w="19050">
+              <a:noFill/>
+            </a:ln>
+            <a:effectLst/>
+          </p:spPr>
+          <p:style>
+            <a:lnRef idx="2">
+              <a:schemeClr val="accent1">
+                <a:shade val="50000"/>
+              </a:schemeClr>
+            </a:lnRef>
+            <a:fillRef idx="1001">
+              <a:schemeClr val="dk2"/>
+            </a:fillRef>
+            <a:effectRef idx="0">
+              <a:schemeClr val="accent1"/>
+            </a:effectRef>
+            <a:fontRef idx="minor">
+              <a:schemeClr val="lt1"/>
+            </a:fontRef>
+          </p:style>
+          <p:txBody>
+            <a:bodyPr rot="0" spcFirstLastPara="0" vertOverflow="overflow" horzOverflow="overflow" vert="horz" wrap="square" lIns="91440" tIns="45720" rIns="91440" bIns="45720" numCol="1" spcCol="0" rtlCol="0" fromWordArt="0" anchor="ctr" anchorCtr="0" forceAA="0" compatLnSpc="1">
+              <a:prstTxWarp prst="textNoShape">
+                <a:avLst/>
+              </a:prstTxWarp>
+              <a:noAutofit/>
+            </a:bodyPr>
+            <a:lstStyle/>
+            <a:p>
+              <a:pPr algn="ctr"/>
+              <a:endParaRPr lang="en-BG" sz="2800" b="1" dirty="0">
+                <a:solidFill>
+                  <a:srgbClr val="FFFFFF"/>
                 </a:solidFill>
                 <a:effectLst>
-                  <a:outerShdw blurRad="38100" dist="19050" dir="2700000" algn="tl" rotWithShape="0">
-                    <a:schemeClr val="dk1">
-                      <a:alpha val="40000"/>
-                    </a:schemeClr>
+                  <a:outerShdw blurRad="38100" dist="38100" dir="2700000" algn="tl">
+                    <a:srgbClr val="000000">
+                      <a:alpha val="43137"/>
+                    </a:srgbClr>
                   </a:outerShdw>
                 </a:effectLst>
-              </a:rPr>
-              <a:t> = </a:t>
-            </a:r>
-            <a:r>
-              <a:rPr lang="en-US" sz="2800" dirty="0" err="1">
-                <a:ln w="0"/>
-                <a:solidFill>
-                  <a:schemeClr val="tx1"/>
-                </a:solidFill>
-                <a:effectLst>
-                  <a:outerShdw blurRad="38100" dist="19050" dir="2700000" algn="tl" rotWithShape="0">
-                    <a:schemeClr val="dk1">
-                      <a:alpha val="40000"/>
-                    </a:schemeClr>
-                  </a:outerShdw>
-                </a:effectLst>
-              </a:rPr>
-              <a:t>i</a:t>
-            </a:r>
-            <a:r>
-              <a:rPr lang="en-US" sz="2800" dirty="0">
-                <a:ln w="0"/>
-                <a:solidFill>
-                  <a:schemeClr val="tx1"/>
-                </a:solidFill>
-                <a:effectLst>
-                  <a:outerShdw blurRad="38100" dist="19050" dir="2700000" algn="tl" rotWithShape="0">
-                    <a:schemeClr val="dk1">
-                      <a:alpha val="40000"/>
-                    </a:schemeClr>
-                  </a:outerShdw>
-                </a:effectLst>
-              </a:rPr>
-              <a:t> + 1</a:t>
-            </a:r>
-          </a:p>
-        </p:txBody>
-      </p:sp>
+              </a:endParaRPr>
+            </a:p>
+          </p:txBody>
+        </p:sp>
+      </p:grpSp>
     </p:spTree>
     <p:extLst>
       <p:ext uri="{BB962C8B-B14F-4D97-AF65-F5344CB8AC3E}">
@@ -40643,7 +41069,7 @@
                             </p:stCondLst>
                             <p:childTnLst>
                               <p:par>
-                                <p:cTn id="5" presetID="1" presetClass="entr" presetSubtype="0" fill="hold" nodeType="clickEffect">
+                                <p:cTn id="5" presetID="1" presetClass="entr" presetSubtype="0" fill="hold" grpId="0" nodeType="clickEffect">
                                   <p:stCondLst>
                                     <p:cond delay="0"/>
                                   </p:stCondLst>
@@ -40651,51 +41077,6 @@
                                     <p:set>
                                       <p:cBhvr>
                                         <p:cTn id="6" dur="1" fill="hold">
-                                          <p:stCondLst>
-                                            <p:cond delay="0"/>
-                                          </p:stCondLst>
-                                        </p:cTn>
-                                        <p:tgtEl>
-                                          <p:spTgt spid="3"/>
-                                        </p:tgtEl>
-                                        <p:attrNameLst>
-                                          <p:attrName>style.visibility</p:attrName>
-                                        </p:attrNameLst>
-                                      </p:cBhvr>
-                                      <p:to>
-                                        <p:strVal val="visible"/>
-                                      </p:to>
-                                    </p:set>
-                                  </p:childTnLst>
-                                </p:cTn>
-                              </p:par>
-                            </p:childTnLst>
-                          </p:cTn>
-                        </p:par>
-                      </p:childTnLst>
-                    </p:cTn>
-                  </p:par>
-                  <p:par>
-                    <p:cTn id="7" fill="hold">
-                      <p:stCondLst>
-                        <p:cond delay="indefinite"/>
-                      </p:stCondLst>
-                      <p:childTnLst>
-                        <p:par>
-                          <p:cTn id="8" fill="hold">
-                            <p:stCondLst>
-                              <p:cond delay="0"/>
-                            </p:stCondLst>
-                            <p:childTnLst>
-                              <p:par>
-                                <p:cTn id="9" presetID="1" presetClass="entr" presetSubtype="0" fill="hold" grpId="0" nodeType="clickEffect">
-                                  <p:stCondLst>
-                                    <p:cond delay="0"/>
-                                  </p:stCondLst>
-                                  <p:childTnLst>
-                                    <p:set>
-                                      <p:cBhvr>
-                                        <p:cTn id="10" dur="1" fill="hold">
                                           <p:stCondLst>
                                             <p:cond delay="0"/>
                                           </p:stCondLst>
@@ -41954,18 +42335,18 @@
           <a:p>
             <a:pPr latinLnBrk="0"/>
             <a:r>
-              <a:rPr lang="bg-BG" sz="4000" dirty="0">
+              <a:rPr lang="bg-BG" sz="3800" dirty="0">
                 <a:latin typeface="Calibri" panose="020F0502020204030204" pitchFamily="34" charset="0"/>
                 <a:cs typeface="Calibri" panose="020F0502020204030204" pitchFamily="34" charset="0"/>
               </a:rPr>
               <a:t>Напишете програма, която отпечатва числата от</a:t>
             </a:r>
             <a:r>
-              <a:rPr lang="bg-BG" sz="4000" dirty="0"/>
+              <a:rPr lang="bg-BG" sz="3800" dirty="0"/>
               <a:t> </a:t>
             </a:r>
             <a:r>
-              <a:rPr lang="bg-BG" sz="4000" b="1" dirty="0">
+              <a:rPr lang="bg-BG" sz="3800" b="1" dirty="0">
                 <a:solidFill>
                   <a:schemeClr val="bg1"/>
                 </a:solidFill>
@@ -41974,22 +42355,22 @@
               <a:t>1</a:t>
             </a:r>
             <a:r>
-              <a:rPr lang="bg-BG" sz="4000" dirty="0"/>
+              <a:rPr lang="bg-BG" sz="3800" dirty="0"/>
               <a:t> </a:t>
             </a:r>
             <a:r>
-              <a:rPr lang="bg-BG" sz="4000" dirty="0">
+              <a:rPr lang="bg-BG" sz="3800" dirty="0">
                 <a:latin typeface="Calibri" panose="020F0502020204030204" pitchFamily="34" charset="0"/>
                 <a:cs typeface="Calibri" panose="020F0502020204030204" pitchFamily="34" charset="0"/>
               </a:rPr>
               <a:t>до</a:t>
             </a:r>
             <a:r>
-              <a:rPr lang="en-US" sz="4000" dirty="0"/>
+              <a:rPr lang="en-US" sz="3800" dirty="0"/>
               <a:t> </a:t>
             </a:r>
             <a:r>
-              <a:rPr lang="en-US" sz="4000" b="1" dirty="0">
+              <a:rPr lang="en-US" sz="3800" b="1" dirty="0">
                 <a:solidFill>
                   <a:schemeClr val="bg1"/>
                 </a:solidFill>
@@ -41998,7 +42379,7 @@
               <a:t>1</a:t>
             </a:r>
             <a:r>
-              <a:rPr lang="bg-BG" sz="4000" b="1" dirty="0">
+              <a:rPr lang="bg-BG" sz="3800" b="1" dirty="0">
                 <a:solidFill>
                   <a:schemeClr val="bg1"/>
                 </a:solidFill>
@@ -42006,7 +42387,7 @@
               </a:rPr>
               <a:t>00</a:t>
             </a:r>
-            <a:endParaRPr lang="bg-BG" sz="4000" dirty="0">
+            <a:endParaRPr lang="bg-BG" sz="3800" dirty="0">
               <a:latin typeface="Calibri" panose="020F0502020204030204" pitchFamily="34" charset="0"/>
               <a:cs typeface="Calibri" panose="020F0502020204030204" pitchFamily="34" charset="0"/>
             </a:endParaRPr>
@@ -42665,21 +43046,7 @@
                 <a:latin typeface="Calibri" panose="020F0502020204030204" pitchFamily="34" charset="0"/>
                 <a:cs typeface="Calibri" panose="020F0502020204030204" pitchFamily="34" charset="0"/>
               </a:rPr>
-              <a:t>(</a:t>
-            </a:r>
-            <a:r>
-              <a:rPr lang="bg-BG" sz="3200" dirty="0" err="1">
-                <a:latin typeface="Calibri" panose="020F0502020204030204" pitchFamily="34" charset="0"/>
-                <a:cs typeface="Calibri" panose="020F0502020204030204" pitchFamily="34" charset="0"/>
-              </a:rPr>
-              <a:t>декрементира</a:t>
-            </a:r>
-            <a:r>
-              <a:rPr lang="bg-BG" sz="3200" dirty="0">
-                <a:latin typeface="Calibri" panose="020F0502020204030204" pitchFamily="34" charset="0"/>
-                <a:cs typeface="Calibri" panose="020F0502020204030204" pitchFamily="34" charset="0"/>
-              </a:rPr>
-              <a:t>)</a:t>
+              <a:t>(декрементиране)</a:t>
             </a:r>
           </a:p>
           <a:p>

</xml_diff>

<commit_message>
Updated judge links for loops basics
</commit_message>
<xml_diff>
--- a/Courses/Software-Sciences/Module-1-OOP-New/04.1-Loops-Basics/04.1-Loops-Basics.pptx
+++ b/Courses/Software-Sciences/Module-1-OOP-New/04.1-Loops-Basics/04.1-Loops-Basics.pptx
@@ -335,7 +335,7 @@
           <a:p>
             <a:fld id="{4E087215-0C8F-4762-A664-737A353EC9A4}" type="datetimeFigureOut">
               <a:rPr lang="bg-BG" smtClean="0"/>
-              <a:t>12.02.23 г.</a:t>
+              <a:t>4.05.23 г.</a:t>
             </a:fld>
             <a:endParaRPr lang="bg-BG"/>
           </a:p>
@@ -526,7 +526,7 @@
           <a:p>
             <a:fld id="{72D84649-876A-46C9-8472-14CB09C070D8}" type="datetimeFigureOut">
               <a:rPr lang="en-US" smtClean="0"/>
-              <a:t>2/12/23</a:t>
+              <a:t>5/4/23</a:t>
             </a:fld>
             <a:endParaRPr lang="en-US"/>
           </a:p>
@@ -26007,7 +26007,7 @@
                 </a:solidFill>
                 <a:hlinkClick r:id="rId2"/>
               </a:rPr>
-              <a:t>https://judge.softuni.org/Contests/Practice/Index/3898#5</a:t>
+              <a:t>https://judge.softuni.org/Contests/Practice/Index/3898#6</a:t>
             </a:r>
             <a:endParaRPr lang="en-US" sz="2000" u="sng" dirty="0">
               <a:solidFill>
@@ -27159,13 +27159,16 @@
               <a:t>Judge: </a:t>
             </a:r>
             <a:r>
-              <a:rPr lang="en-US" sz="2000" u="sng" dirty="0">
-                <a:solidFill>
-                  <a:schemeClr val="bg1"/>
-                </a:solidFill>
+              <a:rPr lang="en-US" sz="2000" dirty="0">
+                <a:hlinkClick r:id="rId3"/>
               </a:rPr>
-              <a:t>https://judge.softuni.org/Contests/Practice/Index/3898#6</a:t>
-            </a:r>
+              <a:t>https://judge.softuni.org/Contests/Practice/Index/3898#9</a:t>
+            </a:r>
+            <a:endParaRPr lang="en-US" sz="2000" u="sng" dirty="0">
+              <a:solidFill>
+                <a:schemeClr val="bg1"/>
+              </a:solidFill>
+            </a:endParaRPr>
           </a:p>
         </p:txBody>
       </p:sp>
@@ -35100,7 +35103,13 @@
               <a:rPr lang="en-US" sz="2199" dirty="0">
                 <a:hlinkClick r:id="rId2"/>
               </a:rPr>
-              <a:t>https://judge.softuni.org/Contests/Practice/Index/3898#8</a:t>
+              <a:t>https://judge.softuni.org</a:t>
+            </a:r>
+            <a:r>
+              <a:rPr lang="en-US" sz="2199">
+                <a:hlinkClick r:id="rId2"/>
+              </a:rPr>
+              <a:t>/Contests/Practice/Index/3898#14</a:t>
             </a:r>
             <a:endParaRPr lang="en-US" sz="2199" dirty="0">
               <a:solidFill>

</xml_diff>